<commit_message>
Savet presentation for sprint 1
</commit_message>
<xml_diff>
--- a/savet.pptx
+++ b/savet.pptx
@@ -8,11 +8,14 @@
     <p:sldId id="256" r:id="rId2"/>
     <p:sldId id="257" r:id="rId3"/>
     <p:sldId id="258" r:id="rId4"/>
-    <p:sldId id="264" r:id="rId5"/>
-    <p:sldId id="259" r:id="rId6"/>
-    <p:sldId id="260" r:id="rId7"/>
-    <p:sldId id="261" r:id="rId8"/>
-    <p:sldId id="262" r:id="rId9"/>
+    <p:sldId id="268" r:id="rId5"/>
+    <p:sldId id="264" r:id="rId6"/>
+    <p:sldId id="259" r:id="rId7"/>
+    <p:sldId id="267" r:id="rId8"/>
+    <p:sldId id="269" r:id="rId9"/>
+    <p:sldId id="260" r:id="rId10"/>
+    <p:sldId id="261" r:id="rId11"/>
+    <p:sldId id="262" r:id="rId12"/>
   </p:sldIdLst>
   <p:sldSz cx="12192000" cy="6858000"/>
   <p:notesSz cx="6858000" cy="9144000"/>
@@ -3354,7 +3357,7 @@
 </p:sld>
 </file>
 
-<file path=ppt/slides/slide2.xml><?xml version="1.0" encoding="utf-8"?>
+<file path=ppt/slides/slide10.xml><?xml version="1.0" encoding="utf-8"?>
 <p:sld xmlns:a="http://schemas.openxmlformats.org/drawingml/2006/main" xmlns:r="http://schemas.openxmlformats.org/officeDocument/2006/relationships" xmlns:p="http://schemas.openxmlformats.org/presentationml/2006/main">
   <p:cSld>
     <p:spTree>
@@ -3376,832 +3379,6 @@
           <p:cNvPr id="3" name="Content Placeholder 2">
             <a:extLst>
               <a:ext uri="{FF2B5EF4-FFF2-40B4-BE49-F238E27FC236}">
-                <a16:creationId xmlns:a16="http://schemas.microsoft.com/office/drawing/2014/main" id="{842C9F51-2FA5-60C1-9E52-2322F35AA4DF}"/>
-              </a:ext>
-            </a:extLst>
-          </p:cNvPr>
-          <p:cNvSpPr>
-            <a:spLocks noGrp="1"/>
-          </p:cNvSpPr>
-          <p:nvPr>
-            <p:ph idx="1"/>
-          </p:nvPr>
-        </p:nvSpPr>
-        <p:spPr>
-          <a:xfrm>
-            <a:off x="480849" y="627446"/>
-            <a:ext cx="10515600" cy="4351338"/>
-          </a:xfrm>
-        </p:spPr>
-        <p:txBody>
-          <a:bodyPr/>
-          <a:lstStyle/>
-          <a:p>
-            <a:pPr marL="0" indent="0">
-              <a:buNone/>
-            </a:pPr>
-            <a:r>
-              <a:rPr lang="en-US" dirty="0">
-                <a:solidFill>
-                  <a:srgbClr val="FE5722"/>
-                </a:solidFill>
-              </a:rPr>
-              <a:t> </a:t>
-            </a:r>
-            <a:r>
-              <a:rPr lang="en-US" sz="4000" dirty="0">
-                <a:solidFill>
-                  <a:srgbClr val="FE5722"/>
-                </a:solidFill>
-              </a:rPr>
-              <a:t>An introduction </a:t>
-            </a:r>
-            <a:br>
-              <a:rPr lang="en-US" dirty="0">
-                <a:solidFill>
-                  <a:srgbClr val="FE5722"/>
-                </a:solidFill>
-              </a:rPr>
-            </a:br>
-            <a:br>
-              <a:rPr lang="en-US" dirty="0">
-                <a:solidFill>
-                  <a:srgbClr val="FE5722"/>
-                </a:solidFill>
-              </a:rPr>
-            </a:br>
-            <a:r>
-              <a:rPr lang="en-US" b="0" i="0" dirty="0" err="1">
-                <a:effectLst/>
-                <a:latin typeface="-apple-system"/>
-              </a:rPr>
-              <a:t>Savet</a:t>
-            </a:r>
-            <a:r>
-              <a:rPr lang="en-US" b="0" i="0" dirty="0">
-                <a:effectLst/>
-                <a:latin typeface="-apple-system"/>
-              </a:rPr>
-              <a:t> is an app that combines saved collections from multiple social media platforms into one place and enables you to share them with friends and family.</a:t>
-            </a:r>
-            <a:r>
-              <a:rPr lang="en-US" dirty="0"/>
-              <a:t> </a:t>
-            </a:r>
-          </a:p>
-        </p:txBody>
-      </p:sp>
-    </p:spTree>
-    <p:extLst>
-      <p:ext uri="{BB962C8B-B14F-4D97-AF65-F5344CB8AC3E}">
-        <p14:creationId xmlns:p14="http://schemas.microsoft.com/office/powerpoint/2010/main" val="2244350774"/>
-      </p:ext>
-    </p:extLst>
-  </p:cSld>
-  <p:clrMapOvr>
-    <a:masterClrMapping/>
-  </p:clrMapOvr>
-</p:sld>
-</file>
-
-<file path=ppt/slides/slide3.xml><?xml version="1.0" encoding="utf-8"?>
-<p:sld xmlns:a="http://schemas.openxmlformats.org/drawingml/2006/main" xmlns:r="http://schemas.openxmlformats.org/officeDocument/2006/relationships" xmlns:p="http://schemas.openxmlformats.org/presentationml/2006/main">
-  <p:cSld>
-    <p:spTree>
-      <p:nvGrpSpPr>
-        <p:cNvPr id="1" name=""/>
-        <p:cNvGrpSpPr/>
-        <p:nvPr/>
-      </p:nvGrpSpPr>
-      <p:grpSpPr>
-        <a:xfrm>
-          <a:off x="0" y="0"/>
-          <a:ext cx="0" cy="0"/>
-          <a:chOff x="0" y="0"/>
-          <a:chExt cx="0" cy="0"/>
-        </a:xfrm>
-      </p:grpSpPr>
-      <p:sp>
-        <p:nvSpPr>
-          <p:cNvPr id="3" name="Content Placeholder 2">
-            <a:extLst>
-              <a:ext uri="{FF2B5EF4-FFF2-40B4-BE49-F238E27FC236}">
-                <a16:creationId xmlns:a16="http://schemas.microsoft.com/office/drawing/2014/main" id="{77128185-03D5-83DF-424E-E94E19D8CA96}"/>
-              </a:ext>
-            </a:extLst>
-          </p:cNvPr>
-          <p:cNvSpPr>
-            <a:spLocks noGrp="1"/>
-          </p:cNvSpPr>
-          <p:nvPr>
-            <p:ph idx="1"/>
-          </p:nvPr>
-        </p:nvSpPr>
-        <p:spPr>
-          <a:xfrm>
-            <a:off x="512379" y="1743240"/>
-            <a:ext cx="11784724" cy="4351338"/>
-          </a:xfrm>
-        </p:spPr>
-        <p:txBody>
-          <a:bodyPr>
-            <a:normAutofit lnSpcReduction="10000"/>
-          </a:bodyPr>
-          <a:lstStyle/>
-          <a:p>
-            <a:pPr algn="l">
-              <a:buFont typeface="Arial" panose="020B0604020202020204" pitchFamily="34" charset="0"/>
-              <a:buChar char="•"/>
-            </a:pPr>
-            <a:r>
-              <a:rPr lang="en-US" b="0" i="0" dirty="0">
-                <a:effectLst/>
-                <a:latin typeface="-apple-system"/>
-              </a:rPr>
-              <a:t>Signup and login with Google and Facebook.</a:t>
-            </a:r>
-          </a:p>
-          <a:p>
-            <a:pPr algn="l">
-              <a:buFont typeface="Arial" panose="020B0604020202020204" pitchFamily="34" charset="0"/>
-              <a:buChar char="•"/>
-            </a:pPr>
-            <a:r>
-              <a:rPr lang="en-US" b="0" i="0" dirty="0">
-                <a:effectLst/>
-                <a:latin typeface="-apple-system"/>
-              </a:rPr>
-              <a:t>Visit as a guest.</a:t>
-            </a:r>
-          </a:p>
-          <a:p>
-            <a:pPr algn="l">
-              <a:buFont typeface="Arial" panose="020B0604020202020204" pitchFamily="34" charset="0"/>
-              <a:buChar char="•"/>
-            </a:pPr>
-            <a:r>
-              <a:rPr lang="en-US" b="0" i="0" dirty="0">
-                <a:effectLst/>
-                <a:latin typeface="-apple-system"/>
-              </a:rPr>
-              <a:t>Change profile photo.</a:t>
-            </a:r>
-          </a:p>
-          <a:p>
-            <a:pPr algn="l">
-              <a:buFont typeface="Arial" panose="020B0604020202020204" pitchFamily="34" charset="0"/>
-              <a:buChar char="•"/>
-            </a:pPr>
-            <a:r>
-              <a:rPr lang="en-US" dirty="0">
-                <a:latin typeface="-apple-system"/>
-              </a:rPr>
-              <a:t>Add new category, give it a name, </a:t>
-            </a:r>
-            <a:r>
-              <a:rPr lang="en-US" b="0" i="0" dirty="0">
-                <a:effectLst/>
-                <a:latin typeface="-apple-system"/>
-              </a:rPr>
-              <a:t>description and image.</a:t>
-            </a:r>
-          </a:p>
-          <a:p>
-            <a:pPr algn="l">
-              <a:buFont typeface="Arial" panose="020B0604020202020204" pitchFamily="34" charset="0"/>
-              <a:buChar char="•"/>
-            </a:pPr>
-            <a:r>
-              <a:rPr lang="en-US" b="0" i="0" dirty="0">
-                <a:effectLst/>
-                <a:latin typeface="-apple-system"/>
-              </a:rPr>
-              <a:t>Make a category private or public and associate it with tags.</a:t>
-            </a:r>
-          </a:p>
-          <a:p>
-            <a:r>
-              <a:rPr lang="en-US" b="0" i="0" dirty="0">
-                <a:effectLst/>
-                <a:latin typeface="-apple-system"/>
-              </a:rPr>
-              <a:t>Add content from gallery &amp; camera into categories and give it a description.</a:t>
-            </a:r>
-          </a:p>
-          <a:p>
-            <a:r>
-              <a:rPr lang="en-US" dirty="0">
-                <a:latin typeface="-apple-system"/>
-              </a:rPr>
-              <a:t>Save images in different sizes (staggered grid view)</a:t>
-            </a:r>
-            <a:endParaRPr lang="en-US" b="0" i="0" dirty="0">
-              <a:effectLst/>
-              <a:latin typeface="-apple-system"/>
-            </a:endParaRPr>
-          </a:p>
-          <a:p>
-            <a:r>
-              <a:rPr lang="en-US" dirty="0">
-                <a:latin typeface="-apple-system"/>
-              </a:rPr>
-              <a:t>Remove a category/items.</a:t>
-            </a:r>
-            <a:endParaRPr lang="en-US" b="0" i="0" dirty="0">
-              <a:effectLst/>
-              <a:latin typeface="-apple-system"/>
-            </a:endParaRPr>
-          </a:p>
-          <a:p>
-            <a:pPr algn="l">
-              <a:buFont typeface="Arial" panose="020B0604020202020204" pitchFamily="34" charset="0"/>
-              <a:buChar char="•"/>
-            </a:pPr>
-            <a:r>
-              <a:rPr lang="en-US" b="0" i="0" dirty="0">
-                <a:effectLst/>
-                <a:latin typeface="-apple-system"/>
-              </a:rPr>
-              <a:t>Sort categories manually by dragging an item.</a:t>
-            </a:r>
-          </a:p>
-          <a:p>
-            <a:pPr algn="l">
-              <a:buFont typeface="Arial" panose="020B0604020202020204" pitchFamily="34" charset="0"/>
-              <a:buChar char="•"/>
-            </a:pPr>
-            <a:r>
-              <a:rPr lang="en-US" b="0" i="0" dirty="0">
-                <a:effectLst/>
-                <a:latin typeface="-apple-system"/>
-              </a:rPr>
-              <a:t>Save recently added items into a category.</a:t>
-            </a:r>
-          </a:p>
-          <a:p>
-            <a:pPr algn="l">
-              <a:buFont typeface="Arial" panose="020B0604020202020204" pitchFamily="34" charset="0"/>
-              <a:buChar char="•"/>
-            </a:pPr>
-            <a:r>
-              <a:rPr lang="en-US" dirty="0">
-                <a:latin typeface="-apple-system"/>
-              </a:rPr>
-              <a:t>Follow &amp; unfollow friends and see their public categories.</a:t>
-            </a:r>
-            <a:endParaRPr lang="en-US" b="0" i="0" dirty="0">
-              <a:effectLst/>
-              <a:latin typeface="-apple-system"/>
-            </a:endParaRPr>
-          </a:p>
-          <a:p>
-            <a:pPr algn="l">
-              <a:buFont typeface="Arial" panose="020B0604020202020204" pitchFamily="34" charset="0"/>
-              <a:buChar char="•"/>
-            </a:pPr>
-            <a:endParaRPr lang="en-US" b="0" i="0" dirty="0">
-              <a:effectLst/>
-              <a:latin typeface="-apple-system"/>
-            </a:endParaRPr>
-          </a:p>
-          <a:p>
-            <a:endParaRPr lang="en-US" dirty="0"/>
-          </a:p>
-        </p:txBody>
-      </p:sp>
-      <p:sp>
-        <p:nvSpPr>
-          <p:cNvPr id="5" name="TextBox 4">
-            <a:extLst>
-              <a:ext uri="{FF2B5EF4-FFF2-40B4-BE49-F238E27FC236}">
-                <a16:creationId xmlns:a16="http://schemas.microsoft.com/office/drawing/2014/main" id="{0897FBD2-C2B7-22AF-09CF-A4FA8E54E13B}"/>
-              </a:ext>
-            </a:extLst>
-          </p:cNvPr>
-          <p:cNvSpPr txBox="1"/>
-          <p:nvPr/>
-        </p:nvSpPr>
-        <p:spPr>
-          <a:xfrm>
-            <a:off x="667407" y="342635"/>
-            <a:ext cx="8213833" cy="1200329"/>
-          </a:xfrm>
-          <a:prstGeom prst="rect">
-            <a:avLst/>
-          </a:prstGeom>
-          <a:noFill/>
-        </p:spPr>
-        <p:txBody>
-          <a:bodyPr wrap="square">
-            <a:spAutoFit/>
-          </a:bodyPr>
-          <a:lstStyle/>
-          <a:p>
-            <a:r>
-              <a:rPr lang="en-US" sz="3600" b="1" dirty="0">
-                <a:solidFill>
-                  <a:srgbClr val="FE5722"/>
-                </a:solidFill>
-              </a:rPr>
-              <a:t>Key features of the app (which are already implemented)</a:t>
-            </a:r>
-            <a:endParaRPr lang="en-US" sz="3600" dirty="0"/>
-          </a:p>
-        </p:txBody>
-      </p:sp>
-    </p:spTree>
-    <p:extLst>
-      <p:ext uri="{BB962C8B-B14F-4D97-AF65-F5344CB8AC3E}">
-        <p14:creationId xmlns:p14="http://schemas.microsoft.com/office/powerpoint/2010/main" val="2598676710"/>
-      </p:ext>
-    </p:extLst>
-  </p:cSld>
-  <p:clrMapOvr>
-    <a:masterClrMapping/>
-  </p:clrMapOvr>
-</p:sld>
-</file>
-
-<file path=ppt/slides/slide4.xml><?xml version="1.0" encoding="utf-8"?>
-<p:sld xmlns:a="http://schemas.openxmlformats.org/drawingml/2006/main" xmlns:r="http://schemas.openxmlformats.org/officeDocument/2006/relationships" xmlns:p="http://schemas.openxmlformats.org/presentationml/2006/main">
-  <p:cSld>
-    <p:spTree>
-      <p:nvGrpSpPr>
-        <p:cNvPr id="1" name=""/>
-        <p:cNvGrpSpPr/>
-        <p:nvPr/>
-      </p:nvGrpSpPr>
-      <p:grpSpPr>
-        <a:xfrm>
-          <a:off x="0" y="0"/>
-          <a:ext cx="0" cy="0"/>
-          <a:chOff x="0" y="0"/>
-          <a:chExt cx="0" cy="0"/>
-        </a:xfrm>
-      </p:grpSpPr>
-      <p:pic>
-        <p:nvPicPr>
-          <p:cNvPr id="5" name="Content Placeholder 4" descr="Graphical user interface, application&#10;&#10;Description automatically generated">
-            <a:extLst>
-              <a:ext uri="{FF2B5EF4-FFF2-40B4-BE49-F238E27FC236}">
-                <a16:creationId xmlns:a16="http://schemas.microsoft.com/office/drawing/2014/main" id="{73126A08-C434-1B75-C7F1-F90F0703FCA2}"/>
-              </a:ext>
-            </a:extLst>
-          </p:cNvPr>
-          <p:cNvPicPr>
-            <a:picLocks noGrp="1" noChangeAspect="1"/>
-          </p:cNvPicPr>
-          <p:nvPr>
-            <p:ph idx="1"/>
-          </p:nvPr>
-        </p:nvPicPr>
-        <p:blipFill>
-          <a:blip r:embed="rId2">
-            <a:extLst>
-              <a:ext uri="{28A0092B-C50C-407E-A947-70E740481C1C}">
-                <a14:useLocalDpi xmlns:a14="http://schemas.microsoft.com/office/drawing/2010/main" val="0"/>
-              </a:ext>
-            </a:extLst>
-          </a:blip>
-          <a:stretch>
-            <a:fillRect/>
-          </a:stretch>
-        </p:blipFill>
-        <p:spPr>
-          <a:xfrm>
-            <a:off x="5341466" y="2638425"/>
-            <a:ext cx="1509068" cy="3101975"/>
-          </a:xfrm>
-        </p:spPr>
-      </p:pic>
-      <p:sp>
-        <p:nvSpPr>
-          <p:cNvPr id="7" name="TextBox 6">
-            <a:extLst>
-              <a:ext uri="{FF2B5EF4-FFF2-40B4-BE49-F238E27FC236}">
-                <a16:creationId xmlns:a16="http://schemas.microsoft.com/office/drawing/2014/main" id="{BFFF5A1D-FC97-74DC-1843-8EBD2B4B49C2}"/>
-              </a:ext>
-            </a:extLst>
-          </p:cNvPr>
-          <p:cNvSpPr txBox="1"/>
-          <p:nvPr/>
-        </p:nvSpPr>
-        <p:spPr>
-          <a:xfrm>
-            <a:off x="401537" y="1690688"/>
-            <a:ext cx="6096000" cy="2031325"/>
-          </a:xfrm>
-          <a:prstGeom prst="rect">
-            <a:avLst/>
-          </a:prstGeom>
-          <a:noFill/>
-        </p:spPr>
-        <p:txBody>
-          <a:bodyPr wrap="square">
-            <a:spAutoFit/>
-          </a:bodyPr>
-          <a:lstStyle/>
-          <a:p>
-            <a:pPr algn="l">
-              <a:buFont typeface="Arial" panose="020B0604020202020204" pitchFamily="34" charset="0"/>
-              <a:buChar char="•"/>
-            </a:pPr>
-            <a:r>
-              <a:rPr lang="en-US" dirty="0">
-                <a:latin typeface="-apple-system"/>
-              </a:rPr>
-              <a:t>Add new category, give it a name, </a:t>
-            </a:r>
-            <a:r>
-              <a:rPr lang="en-US" b="0" i="0" dirty="0">
-                <a:effectLst/>
-                <a:latin typeface="-apple-system"/>
-              </a:rPr>
-              <a:t>description and image.</a:t>
-            </a:r>
-            <a:br>
-              <a:rPr lang="en-US" b="0" i="0" dirty="0">
-                <a:effectLst/>
-                <a:latin typeface="-apple-system"/>
-              </a:rPr>
-            </a:br>
-            <a:endParaRPr lang="en-US" b="0" i="0" dirty="0">
-              <a:effectLst/>
-              <a:latin typeface="-apple-system"/>
-            </a:endParaRPr>
-          </a:p>
-          <a:p>
-            <a:pPr algn="l">
-              <a:buFont typeface="Arial" panose="020B0604020202020204" pitchFamily="34" charset="0"/>
-              <a:buChar char="•"/>
-            </a:pPr>
-            <a:r>
-              <a:rPr lang="en-US" b="0" i="0" dirty="0">
-                <a:effectLst/>
-                <a:latin typeface="-apple-system"/>
-              </a:rPr>
-              <a:t>Make a category private or public and associate it with tags.</a:t>
-            </a:r>
-            <a:br>
-              <a:rPr lang="en-US" b="0" i="0" dirty="0">
-                <a:effectLst/>
-                <a:latin typeface="-apple-system"/>
-              </a:rPr>
-            </a:br>
-            <a:endParaRPr lang="en-US" b="0" i="0" dirty="0">
-              <a:effectLst/>
-              <a:latin typeface="-apple-system"/>
-            </a:endParaRPr>
-          </a:p>
-          <a:p>
-            <a:pPr>
-              <a:buFont typeface="Arial" panose="020B0604020202020204" pitchFamily="34" charset="0"/>
-              <a:buChar char="•"/>
-            </a:pPr>
-            <a:r>
-              <a:rPr lang="en-US" dirty="0">
-                <a:latin typeface="-apple-system"/>
-              </a:rPr>
-              <a:t>Remove a category.</a:t>
-            </a:r>
-            <a:br>
-              <a:rPr lang="en-US" dirty="0">
-                <a:latin typeface="-apple-system"/>
-              </a:rPr>
-            </a:br>
-            <a:endParaRPr lang="en-US" dirty="0">
-              <a:latin typeface="-apple-system"/>
-            </a:endParaRPr>
-          </a:p>
-          <a:p>
-            <a:pPr>
-              <a:buFont typeface="Arial" panose="020B0604020202020204" pitchFamily="34" charset="0"/>
-              <a:buChar char="•"/>
-            </a:pPr>
-            <a:r>
-              <a:rPr lang="en-US" b="0" i="0" dirty="0">
-                <a:effectLst/>
-                <a:latin typeface="-apple-system"/>
-              </a:rPr>
-              <a:t>Sort categories manually by dragging an item.</a:t>
-            </a:r>
-          </a:p>
-        </p:txBody>
-      </p:sp>
-      <p:cxnSp>
-        <p:nvCxnSpPr>
-          <p:cNvPr id="9" name="Straight Arrow Connector 8">
-            <a:extLst>
-              <a:ext uri="{FF2B5EF4-FFF2-40B4-BE49-F238E27FC236}">
-                <a16:creationId xmlns:a16="http://schemas.microsoft.com/office/drawing/2014/main" id="{CB4966FB-4CDA-2A3B-F019-871507DDE272}"/>
-              </a:ext>
-            </a:extLst>
-          </p:cNvPr>
-          <p:cNvCxnSpPr/>
-          <p:nvPr/>
-        </p:nvCxnSpPr>
-        <p:spPr>
-          <a:xfrm>
-            <a:off x="8965324" y="4180571"/>
-            <a:ext cx="1124607" cy="0"/>
-          </a:xfrm>
-          <a:prstGeom prst="straightConnector1">
-            <a:avLst/>
-          </a:prstGeom>
-          <a:ln>
-            <a:solidFill>
-              <a:srgbClr val="FE5722"/>
-            </a:solidFill>
-            <a:tailEnd type="triangle"/>
-          </a:ln>
-        </p:spPr>
-        <p:style>
-          <a:lnRef idx="1">
-            <a:schemeClr val="accent1"/>
-          </a:lnRef>
-          <a:fillRef idx="0">
-            <a:schemeClr val="accent1"/>
-          </a:fillRef>
-          <a:effectRef idx="0">
-            <a:schemeClr val="accent1"/>
-          </a:effectRef>
-          <a:fontRef idx="minor">
-            <a:schemeClr val="tx1"/>
-          </a:fontRef>
-        </p:style>
-      </p:cxnSp>
-      <p:sp>
-        <p:nvSpPr>
-          <p:cNvPr id="11" name="TextBox 10">
-            <a:extLst>
-              <a:ext uri="{FF2B5EF4-FFF2-40B4-BE49-F238E27FC236}">
-                <a16:creationId xmlns:a16="http://schemas.microsoft.com/office/drawing/2014/main" id="{C365FF57-8265-C69C-B1CA-74846DF9DC54}"/>
-              </a:ext>
-            </a:extLst>
-          </p:cNvPr>
-          <p:cNvSpPr txBox="1"/>
-          <p:nvPr/>
-        </p:nvSpPr>
-        <p:spPr>
-          <a:xfrm>
-            <a:off x="493987" y="471269"/>
-            <a:ext cx="6096000" cy="646331"/>
-          </a:xfrm>
-          <a:prstGeom prst="rect">
-            <a:avLst/>
-          </a:prstGeom>
-          <a:noFill/>
-        </p:spPr>
-        <p:txBody>
-          <a:bodyPr wrap="square">
-            <a:spAutoFit/>
-          </a:bodyPr>
-          <a:lstStyle/>
-          <a:p>
-            <a:r>
-              <a:rPr lang="en-US" sz="3600" dirty="0">
-                <a:solidFill>
-                  <a:srgbClr val="FE5722"/>
-                </a:solidFill>
-              </a:rPr>
-              <a:t>Home page :</a:t>
-            </a:r>
-            <a:endParaRPr lang="en-US" sz="3600" dirty="0"/>
-          </a:p>
-        </p:txBody>
-      </p:sp>
-    </p:spTree>
-    <p:extLst>
-      <p:ext uri="{BB962C8B-B14F-4D97-AF65-F5344CB8AC3E}">
-        <p14:creationId xmlns:p14="http://schemas.microsoft.com/office/powerpoint/2010/main" val="520359915"/>
-      </p:ext>
-    </p:extLst>
-  </p:cSld>
-  <p:clrMapOvr>
-    <a:masterClrMapping/>
-  </p:clrMapOvr>
-</p:sld>
-</file>
-
-<file path=ppt/slides/slide5.xml><?xml version="1.0" encoding="utf-8"?>
-<p:sld xmlns:a="http://schemas.openxmlformats.org/drawingml/2006/main" xmlns:r="http://schemas.openxmlformats.org/officeDocument/2006/relationships" xmlns:p="http://schemas.openxmlformats.org/presentationml/2006/main">
-  <p:cSld>
-    <p:spTree>
-      <p:nvGrpSpPr>
-        <p:cNvPr id="1" name=""/>
-        <p:cNvGrpSpPr/>
-        <p:nvPr/>
-      </p:nvGrpSpPr>
-      <p:grpSpPr>
-        <a:xfrm>
-          <a:off x="0" y="0"/>
-          <a:ext cx="0" cy="0"/>
-          <a:chOff x="0" y="0"/>
-          <a:chExt cx="0" cy="0"/>
-        </a:xfrm>
-      </p:grpSpPr>
-      <p:sp>
-        <p:nvSpPr>
-          <p:cNvPr id="3" name="Content Placeholder 2">
-            <a:extLst>
-              <a:ext uri="{FF2B5EF4-FFF2-40B4-BE49-F238E27FC236}">
-                <a16:creationId xmlns:a16="http://schemas.microsoft.com/office/drawing/2014/main" id="{2EC30B42-A385-5335-051F-FE33DEF5EDA4}"/>
-              </a:ext>
-            </a:extLst>
-          </p:cNvPr>
-          <p:cNvSpPr>
-            <a:spLocks noGrp="1"/>
-          </p:cNvSpPr>
-          <p:nvPr>
-            <p:ph idx="1"/>
-          </p:nvPr>
-        </p:nvSpPr>
-        <p:spPr/>
-        <p:txBody>
-          <a:bodyPr/>
-          <a:lstStyle/>
-          <a:p>
-            <a:endParaRPr lang="en-US" dirty="0"/>
-          </a:p>
-        </p:txBody>
-      </p:sp>
-      <p:sp>
-        <p:nvSpPr>
-          <p:cNvPr id="5" name="TextBox 4">
-            <a:extLst>
-              <a:ext uri="{FF2B5EF4-FFF2-40B4-BE49-F238E27FC236}">
-                <a16:creationId xmlns:a16="http://schemas.microsoft.com/office/drawing/2014/main" id="{6C1AC739-9ABF-A147-0EC1-624897B657AB}"/>
-              </a:ext>
-            </a:extLst>
-          </p:cNvPr>
-          <p:cNvSpPr txBox="1"/>
-          <p:nvPr/>
-        </p:nvSpPr>
-        <p:spPr>
-          <a:xfrm>
-            <a:off x="819806" y="656308"/>
-            <a:ext cx="9911255" cy="1754326"/>
-          </a:xfrm>
-          <a:prstGeom prst="rect">
-            <a:avLst/>
-          </a:prstGeom>
-          <a:noFill/>
-        </p:spPr>
-        <p:txBody>
-          <a:bodyPr wrap="square">
-            <a:spAutoFit/>
-          </a:bodyPr>
-          <a:lstStyle/>
-          <a:p>
-            <a:r>
-              <a:rPr lang="en-US" sz="3600" dirty="0">
-                <a:solidFill>
-                  <a:srgbClr val="FE5722"/>
-                </a:solidFill>
-              </a:rPr>
-              <a:t>Features which you did not yet implement for the first sprint (but you plan on doing for the next one)</a:t>
-            </a:r>
-            <a:br>
-              <a:rPr lang="en-US" sz="3600" dirty="0">
-                <a:solidFill>
-                  <a:srgbClr val="FE5722"/>
-                </a:solidFill>
-              </a:rPr>
-            </a:br>
-            <a:endParaRPr lang="en-US" sz="3600" dirty="0"/>
-          </a:p>
-        </p:txBody>
-      </p:sp>
-    </p:spTree>
-    <p:extLst>
-      <p:ext uri="{BB962C8B-B14F-4D97-AF65-F5344CB8AC3E}">
-        <p14:creationId xmlns:p14="http://schemas.microsoft.com/office/powerpoint/2010/main" val="555266064"/>
-      </p:ext>
-    </p:extLst>
-  </p:cSld>
-  <p:clrMapOvr>
-    <a:masterClrMapping/>
-  </p:clrMapOvr>
-</p:sld>
-</file>
-
-<file path=ppt/slides/slide6.xml><?xml version="1.0" encoding="utf-8"?>
-<p:sld xmlns:a="http://schemas.openxmlformats.org/drawingml/2006/main" xmlns:r="http://schemas.openxmlformats.org/officeDocument/2006/relationships" xmlns:p="http://schemas.openxmlformats.org/presentationml/2006/main">
-  <p:cSld>
-    <p:spTree>
-      <p:nvGrpSpPr>
-        <p:cNvPr id="1" name=""/>
-        <p:cNvGrpSpPr/>
-        <p:nvPr/>
-      </p:nvGrpSpPr>
-      <p:grpSpPr>
-        <a:xfrm>
-          <a:off x="0" y="0"/>
-          <a:ext cx="0" cy="0"/>
-          <a:chOff x="0" y="0"/>
-          <a:chExt cx="0" cy="0"/>
-        </a:xfrm>
-      </p:grpSpPr>
-      <p:sp>
-        <p:nvSpPr>
-          <p:cNvPr id="3" name="Content Placeholder 2">
-            <a:extLst>
-              <a:ext uri="{FF2B5EF4-FFF2-40B4-BE49-F238E27FC236}">
-                <a16:creationId xmlns:a16="http://schemas.microsoft.com/office/drawing/2014/main" id="{F679FF30-8501-DC4A-42B5-5DAA3D12C794}"/>
-              </a:ext>
-            </a:extLst>
-          </p:cNvPr>
-          <p:cNvSpPr>
-            <a:spLocks noGrp="1"/>
-          </p:cNvSpPr>
-          <p:nvPr>
-            <p:ph idx="1"/>
-          </p:nvPr>
-        </p:nvSpPr>
-        <p:spPr/>
-        <p:txBody>
-          <a:bodyPr/>
-          <a:lstStyle/>
-          <a:p>
-            <a:endParaRPr lang="en-US"/>
-          </a:p>
-        </p:txBody>
-      </p:sp>
-      <p:sp>
-        <p:nvSpPr>
-          <p:cNvPr id="7" name="TextBox 6">
-            <a:extLst>
-              <a:ext uri="{FF2B5EF4-FFF2-40B4-BE49-F238E27FC236}">
-                <a16:creationId xmlns:a16="http://schemas.microsoft.com/office/drawing/2014/main" id="{648EFED8-F9DC-F5D0-BAA4-2A1A0EB41D89}"/>
-              </a:ext>
-            </a:extLst>
-          </p:cNvPr>
-          <p:cNvSpPr txBox="1"/>
-          <p:nvPr/>
-        </p:nvSpPr>
-        <p:spPr>
-          <a:xfrm>
-            <a:off x="399394" y="629885"/>
-            <a:ext cx="6096000" cy="1200329"/>
-          </a:xfrm>
-          <a:prstGeom prst="rect">
-            <a:avLst/>
-          </a:prstGeom>
-          <a:noFill/>
-        </p:spPr>
-        <p:txBody>
-          <a:bodyPr wrap="square">
-            <a:spAutoFit/>
-          </a:bodyPr>
-          <a:lstStyle/>
-          <a:p>
-            <a:r>
-              <a:rPr lang="en-US" sz="3600" dirty="0">
-                <a:solidFill>
-                  <a:srgbClr val="FE5722"/>
-                </a:solidFill>
-              </a:rPr>
-              <a:t>A recorded/live demo of your application</a:t>
-            </a:r>
-            <a:endParaRPr lang="en-US" sz="3600" dirty="0"/>
-          </a:p>
-        </p:txBody>
-      </p:sp>
-    </p:spTree>
-    <p:extLst>
-      <p:ext uri="{BB962C8B-B14F-4D97-AF65-F5344CB8AC3E}">
-        <p14:creationId xmlns:p14="http://schemas.microsoft.com/office/powerpoint/2010/main" val="1873534557"/>
-      </p:ext>
-    </p:extLst>
-  </p:cSld>
-  <p:clrMapOvr>
-    <a:masterClrMapping/>
-  </p:clrMapOvr>
-</p:sld>
-</file>
-
-<file path=ppt/slides/slide7.xml><?xml version="1.0" encoding="utf-8"?>
-<p:sld xmlns:a="http://schemas.openxmlformats.org/drawingml/2006/main" xmlns:r="http://schemas.openxmlformats.org/officeDocument/2006/relationships" xmlns:p="http://schemas.openxmlformats.org/presentationml/2006/main">
-  <p:cSld>
-    <p:spTree>
-      <p:nvGrpSpPr>
-        <p:cNvPr id="1" name=""/>
-        <p:cNvGrpSpPr/>
-        <p:nvPr/>
-      </p:nvGrpSpPr>
-      <p:grpSpPr>
-        <a:xfrm>
-          <a:off x="0" y="0"/>
-          <a:ext cx="0" cy="0"/>
-          <a:chOff x="0" y="0"/>
-          <a:chExt cx="0" cy="0"/>
-        </a:xfrm>
-      </p:grpSpPr>
-      <p:sp>
-        <p:nvSpPr>
-          <p:cNvPr id="3" name="Content Placeholder 2">
-            <a:extLst>
-              <a:ext uri="{FF2B5EF4-FFF2-40B4-BE49-F238E27FC236}">
                 <a16:creationId xmlns:a16="http://schemas.microsoft.com/office/drawing/2014/main" id="{F0BACC31-BAD1-DE66-8516-000B19FAE03A}"/>
               </a:ext>
             </a:extLst>
@@ -4277,7 +3454,7 @@
 </p:sld>
 </file>
 
-<file path=ppt/slides/slide8.xml><?xml version="1.0" encoding="utf-8"?>
+<file path=ppt/slides/slide11.xml><?xml version="1.0" encoding="utf-8"?>
 <p:sld xmlns:a="http://schemas.openxmlformats.org/drawingml/2006/main" xmlns:r="http://schemas.openxmlformats.org/officeDocument/2006/relationships" xmlns:p="http://schemas.openxmlformats.org/presentationml/2006/main">
   <p:cSld>
     <p:spTree>
@@ -4367,7 +3544,7 @@
         </p:nvSpPr>
         <p:spPr>
           <a:xfrm>
-            <a:off x="4084583" y="2767280"/>
+            <a:off x="4084583" y="964692"/>
             <a:ext cx="4022834" cy="1323439"/>
           </a:xfrm>
           <a:prstGeom prst="rect">
@@ -4422,7 +3599,7 @@
         </p:blipFill>
         <p:spPr>
           <a:xfrm>
-            <a:off x="5553075" y="4216885"/>
+            <a:off x="5553075" y="2886075"/>
             <a:ext cx="1085850" cy="1085850"/>
           </a:xfrm>
           <a:prstGeom prst="rect">
@@ -4434,6 +3611,4053 @@
     <p:extLst>
       <p:ext uri="{BB962C8B-B14F-4D97-AF65-F5344CB8AC3E}">
         <p14:creationId xmlns:p14="http://schemas.microsoft.com/office/powerpoint/2010/main" val="3119078796"/>
+      </p:ext>
+    </p:extLst>
+  </p:cSld>
+  <p:clrMapOvr>
+    <a:masterClrMapping/>
+  </p:clrMapOvr>
+</p:sld>
+</file>
+
+<file path=ppt/slides/slide2.xml><?xml version="1.0" encoding="utf-8"?>
+<p:sld xmlns:a="http://schemas.openxmlformats.org/drawingml/2006/main" xmlns:r="http://schemas.openxmlformats.org/officeDocument/2006/relationships" xmlns:p="http://schemas.openxmlformats.org/presentationml/2006/main">
+  <p:cSld>
+    <p:spTree>
+      <p:nvGrpSpPr>
+        <p:cNvPr id="1" name=""/>
+        <p:cNvGrpSpPr/>
+        <p:nvPr/>
+      </p:nvGrpSpPr>
+      <p:grpSpPr>
+        <a:xfrm>
+          <a:off x="0" y="0"/>
+          <a:ext cx="0" cy="0"/>
+          <a:chOff x="0" y="0"/>
+          <a:chExt cx="0" cy="0"/>
+        </a:xfrm>
+      </p:grpSpPr>
+      <p:sp>
+        <p:nvSpPr>
+          <p:cNvPr id="3" name="Content Placeholder 2">
+            <a:extLst>
+              <a:ext uri="{FF2B5EF4-FFF2-40B4-BE49-F238E27FC236}">
+                <a16:creationId xmlns:a16="http://schemas.microsoft.com/office/drawing/2014/main" id="{842C9F51-2FA5-60C1-9E52-2322F35AA4DF}"/>
+              </a:ext>
+            </a:extLst>
+          </p:cNvPr>
+          <p:cNvSpPr>
+            <a:spLocks noGrp="1"/>
+          </p:cNvSpPr>
+          <p:nvPr>
+            <p:ph idx="1"/>
+          </p:nvPr>
+        </p:nvSpPr>
+        <p:spPr>
+          <a:xfrm>
+            <a:off x="480849" y="627446"/>
+            <a:ext cx="10515600" cy="4351338"/>
+          </a:xfrm>
+        </p:spPr>
+        <p:txBody>
+          <a:bodyPr/>
+          <a:lstStyle/>
+          <a:p>
+            <a:pPr marL="0" indent="0">
+              <a:buNone/>
+            </a:pPr>
+            <a:r>
+              <a:rPr lang="en-US" dirty="0">
+                <a:solidFill>
+                  <a:srgbClr val="FE5722"/>
+                </a:solidFill>
+              </a:rPr>
+              <a:t> </a:t>
+            </a:r>
+            <a:r>
+              <a:rPr lang="en-US" sz="4000" dirty="0">
+                <a:solidFill>
+                  <a:srgbClr val="FE5722"/>
+                </a:solidFill>
+              </a:rPr>
+              <a:t>An introduction </a:t>
+            </a:r>
+            <a:br>
+              <a:rPr lang="en-US" dirty="0">
+                <a:solidFill>
+                  <a:srgbClr val="FE5722"/>
+                </a:solidFill>
+              </a:rPr>
+            </a:br>
+            <a:endParaRPr lang="en-US" dirty="0">
+              <a:solidFill>
+                <a:srgbClr val="FE5722"/>
+              </a:solidFill>
+            </a:endParaRPr>
+          </a:p>
+          <a:p>
+            <a:pPr marL="0" indent="0">
+              <a:buNone/>
+            </a:pPr>
+            <a:r>
+              <a:rPr lang="en-US" b="0" i="0" dirty="0">
+                <a:solidFill>
+                  <a:schemeClr val="tx1"/>
+                </a:solidFill>
+                <a:effectLst/>
+                <a:latin typeface="-apple-system"/>
+              </a:rPr>
+              <a:t>Lately, we've been surrounded by many social media apps, and with that many interesting posts, each app does offer to save these posts under a pinned category to make it possible to find these posts again, but having multiple social media accounts makes it difficult to remember on which platform was each post saved. And that's where '</a:t>
+            </a:r>
+            <a:r>
+              <a:rPr lang="en-US" b="0" i="0" dirty="0" err="1">
+                <a:solidFill>
+                  <a:schemeClr val="tx1"/>
+                </a:solidFill>
+                <a:effectLst/>
+                <a:latin typeface="-apple-system"/>
+              </a:rPr>
+              <a:t>Savet</a:t>
+            </a:r>
+            <a:r>
+              <a:rPr lang="en-US" b="0" i="0" dirty="0">
+                <a:solidFill>
+                  <a:schemeClr val="tx1"/>
+                </a:solidFill>
+                <a:effectLst/>
+                <a:latin typeface="-apple-system"/>
+              </a:rPr>
+              <a:t>' comes, an app that saves each of your favorite content into categories and enables you to share them with friends and family.</a:t>
+            </a:r>
+            <a:r>
+              <a:rPr lang="en-US" dirty="0">
+                <a:solidFill>
+                  <a:schemeClr val="tx1"/>
+                </a:solidFill>
+              </a:rPr>
+              <a:t> </a:t>
+            </a:r>
+            <a:endParaRPr lang="en-US" b="0" i="0" dirty="0">
+              <a:solidFill>
+                <a:schemeClr val="tx1"/>
+              </a:solidFill>
+              <a:effectLst/>
+              <a:latin typeface="-apple-system"/>
+            </a:endParaRPr>
+          </a:p>
+        </p:txBody>
+      </p:sp>
+      <p:pic>
+        <p:nvPicPr>
+          <p:cNvPr id="4" name="Picture 3" descr="A black and white logo&#10;&#10;Description automatically generated with medium confidence">
+            <a:extLst>
+              <a:ext uri="{FF2B5EF4-FFF2-40B4-BE49-F238E27FC236}">
+                <a16:creationId xmlns:a16="http://schemas.microsoft.com/office/drawing/2014/main" id="{BF3A00CE-2E63-C8B8-144D-E0CD9260EF70}"/>
+              </a:ext>
+            </a:extLst>
+          </p:cNvPr>
+          <p:cNvPicPr>
+            <a:picLocks noChangeAspect="1"/>
+          </p:cNvPicPr>
+          <p:nvPr/>
+        </p:nvPicPr>
+        <p:blipFill>
+          <a:blip r:embed="rId2">
+            <a:extLst>
+              <a:ext uri="{28A0092B-C50C-407E-A947-70E740481C1C}">
+                <a14:useLocalDpi xmlns:a14="http://schemas.microsoft.com/office/drawing/2010/main" val="0"/>
+              </a:ext>
+            </a:extLst>
+          </a:blip>
+          <a:stretch>
+            <a:fillRect/>
+          </a:stretch>
+        </p:blipFill>
+        <p:spPr>
+          <a:xfrm>
+            <a:off x="5238750" y="4022178"/>
+            <a:ext cx="1714500" cy="1714500"/>
+          </a:xfrm>
+          <a:prstGeom prst="rect">
+            <a:avLst/>
+          </a:prstGeom>
+        </p:spPr>
+      </p:pic>
+    </p:spTree>
+    <p:extLst>
+      <p:ext uri="{BB962C8B-B14F-4D97-AF65-F5344CB8AC3E}">
+        <p14:creationId xmlns:p14="http://schemas.microsoft.com/office/powerpoint/2010/main" val="2244350774"/>
+      </p:ext>
+    </p:extLst>
+  </p:cSld>
+  <p:clrMapOvr>
+    <a:masterClrMapping/>
+  </p:clrMapOvr>
+</p:sld>
+</file>
+
+<file path=ppt/slides/slide3.xml><?xml version="1.0" encoding="utf-8"?>
+<p:sld xmlns:a="http://schemas.openxmlformats.org/drawingml/2006/main" xmlns:r="http://schemas.openxmlformats.org/officeDocument/2006/relationships" xmlns:p="http://schemas.openxmlformats.org/presentationml/2006/main">
+  <p:cSld>
+    <p:spTree>
+      <p:nvGrpSpPr>
+        <p:cNvPr id="1" name=""/>
+        <p:cNvGrpSpPr/>
+        <p:nvPr/>
+      </p:nvGrpSpPr>
+      <p:grpSpPr>
+        <a:xfrm>
+          <a:off x="0" y="0"/>
+          <a:ext cx="0" cy="0"/>
+          <a:chOff x="0" y="0"/>
+          <a:chExt cx="0" cy="0"/>
+        </a:xfrm>
+      </p:grpSpPr>
+      <p:sp>
+        <p:nvSpPr>
+          <p:cNvPr id="3" name="Content Placeholder 2">
+            <a:extLst>
+              <a:ext uri="{FF2B5EF4-FFF2-40B4-BE49-F238E27FC236}">
+                <a16:creationId xmlns:a16="http://schemas.microsoft.com/office/drawing/2014/main" id="{77128185-03D5-83DF-424E-E94E19D8CA96}"/>
+              </a:ext>
+            </a:extLst>
+          </p:cNvPr>
+          <p:cNvSpPr>
+            <a:spLocks noGrp="1"/>
+          </p:cNvSpPr>
+          <p:nvPr>
+            <p:ph idx="1"/>
+          </p:nvPr>
+        </p:nvSpPr>
+        <p:spPr>
+          <a:xfrm>
+            <a:off x="512379" y="1743240"/>
+            <a:ext cx="11784724" cy="4351338"/>
+          </a:xfrm>
+        </p:spPr>
+        <p:txBody>
+          <a:bodyPr>
+            <a:normAutofit lnSpcReduction="10000"/>
+          </a:bodyPr>
+          <a:lstStyle/>
+          <a:p>
+            <a:pPr algn="l">
+              <a:buFont typeface="Arial" panose="020B0604020202020204" pitchFamily="34" charset="0"/>
+              <a:buChar char="•"/>
+            </a:pPr>
+            <a:r>
+              <a:rPr lang="en-US" b="0" i="0" dirty="0">
+                <a:effectLst/>
+                <a:latin typeface="-apple-system"/>
+              </a:rPr>
+              <a:t>Signup and login with Google and Facebook.</a:t>
+            </a:r>
+          </a:p>
+          <a:p>
+            <a:pPr algn="l">
+              <a:buFont typeface="Arial" panose="020B0604020202020204" pitchFamily="34" charset="0"/>
+              <a:buChar char="•"/>
+            </a:pPr>
+            <a:r>
+              <a:rPr lang="en-US" b="0" i="0" dirty="0">
+                <a:effectLst/>
+                <a:latin typeface="-apple-system"/>
+              </a:rPr>
+              <a:t>Visit as a guest.</a:t>
+            </a:r>
+          </a:p>
+          <a:p>
+            <a:pPr algn="l">
+              <a:buFont typeface="Arial" panose="020B0604020202020204" pitchFamily="34" charset="0"/>
+              <a:buChar char="•"/>
+            </a:pPr>
+            <a:r>
+              <a:rPr lang="en-US" b="0" i="0" dirty="0">
+                <a:effectLst/>
+                <a:latin typeface="-apple-system"/>
+              </a:rPr>
+              <a:t>Change profile photo.</a:t>
+            </a:r>
+          </a:p>
+          <a:p>
+            <a:pPr algn="l">
+              <a:buFont typeface="Arial" panose="020B0604020202020204" pitchFamily="34" charset="0"/>
+              <a:buChar char="•"/>
+            </a:pPr>
+            <a:r>
+              <a:rPr lang="en-US" dirty="0">
+                <a:latin typeface="-apple-system"/>
+              </a:rPr>
+              <a:t>Add new category, give it a name, </a:t>
+            </a:r>
+            <a:r>
+              <a:rPr lang="en-US" b="0" i="0" dirty="0">
+                <a:effectLst/>
+                <a:latin typeface="-apple-system"/>
+              </a:rPr>
+              <a:t>description and image.</a:t>
+            </a:r>
+          </a:p>
+          <a:p>
+            <a:pPr algn="l">
+              <a:buFont typeface="Arial" panose="020B0604020202020204" pitchFamily="34" charset="0"/>
+              <a:buChar char="•"/>
+            </a:pPr>
+            <a:r>
+              <a:rPr lang="en-US" b="0" i="0" dirty="0">
+                <a:effectLst/>
+                <a:latin typeface="-apple-system"/>
+              </a:rPr>
+              <a:t>Make a category private or public and associate it with tags.</a:t>
+            </a:r>
+          </a:p>
+          <a:p>
+            <a:r>
+              <a:rPr lang="en-US" b="0" i="0" dirty="0">
+                <a:effectLst/>
+                <a:latin typeface="-apple-system"/>
+              </a:rPr>
+              <a:t>Add content from gallery &amp; camera into categories and give it a description.</a:t>
+            </a:r>
+          </a:p>
+          <a:p>
+            <a:r>
+              <a:rPr lang="en-US" dirty="0">
+                <a:latin typeface="-apple-system"/>
+              </a:rPr>
+              <a:t>Save images in different sizes (staggered grid view)</a:t>
+            </a:r>
+            <a:endParaRPr lang="en-US" b="0" i="0" dirty="0">
+              <a:effectLst/>
+              <a:latin typeface="-apple-system"/>
+            </a:endParaRPr>
+          </a:p>
+          <a:p>
+            <a:r>
+              <a:rPr lang="en-US" dirty="0">
+                <a:latin typeface="-apple-system"/>
+              </a:rPr>
+              <a:t>Remove a category/items.</a:t>
+            </a:r>
+            <a:endParaRPr lang="en-US" b="0" i="0" dirty="0">
+              <a:effectLst/>
+              <a:latin typeface="-apple-system"/>
+            </a:endParaRPr>
+          </a:p>
+          <a:p>
+            <a:pPr algn="l">
+              <a:buFont typeface="Arial" panose="020B0604020202020204" pitchFamily="34" charset="0"/>
+              <a:buChar char="•"/>
+            </a:pPr>
+            <a:r>
+              <a:rPr lang="en-US" b="0" i="0" dirty="0">
+                <a:effectLst/>
+                <a:latin typeface="-apple-system"/>
+              </a:rPr>
+              <a:t>Sort categories manually by dragging an item.</a:t>
+            </a:r>
+          </a:p>
+          <a:p>
+            <a:pPr algn="l">
+              <a:buFont typeface="Arial" panose="020B0604020202020204" pitchFamily="34" charset="0"/>
+              <a:buChar char="•"/>
+            </a:pPr>
+            <a:r>
+              <a:rPr lang="en-US" b="0" i="0" dirty="0">
+                <a:effectLst/>
+                <a:latin typeface="-apple-system"/>
+              </a:rPr>
+              <a:t>Save recently added items into a category.</a:t>
+            </a:r>
+          </a:p>
+          <a:p>
+            <a:pPr algn="l">
+              <a:buFont typeface="Arial" panose="020B0604020202020204" pitchFamily="34" charset="0"/>
+              <a:buChar char="•"/>
+            </a:pPr>
+            <a:r>
+              <a:rPr lang="en-US" dirty="0">
+                <a:latin typeface="-apple-system"/>
+              </a:rPr>
+              <a:t>Follow &amp; unfollow friends and see their public categories.</a:t>
+            </a:r>
+            <a:endParaRPr lang="en-US" b="0" i="0" dirty="0">
+              <a:effectLst/>
+              <a:latin typeface="-apple-system"/>
+            </a:endParaRPr>
+          </a:p>
+          <a:p>
+            <a:pPr algn="l">
+              <a:buFont typeface="Arial" panose="020B0604020202020204" pitchFamily="34" charset="0"/>
+              <a:buChar char="•"/>
+            </a:pPr>
+            <a:endParaRPr lang="en-US" b="0" i="0" dirty="0">
+              <a:effectLst/>
+              <a:latin typeface="-apple-system"/>
+            </a:endParaRPr>
+          </a:p>
+          <a:p>
+            <a:endParaRPr lang="en-US" dirty="0"/>
+          </a:p>
+        </p:txBody>
+      </p:sp>
+      <p:sp>
+        <p:nvSpPr>
+          <p:cNvPr id="5" name="TextBox 4">
+            <a:extLst>
+              <a:ext uri="{FF2B5EF4-FFF2-40B4-BE49-F238E27FC236}">
+                <a16:creationId xmlns:a16="http://schemas.microsoft.com/office/drawing/2014/main" id="{0897FBD2-C2B7-22AF-09CF-A4FA8E54E13B}"/>
+              </a:ext>
+            </a:extLst>
+          </p:cNvPr>
+          <p:cNvSpPr txBox="1"/>
+          <p:nvPr/>
+        </p:nvSpPr>
+        <p:spPr>
+          <a:xfrm>
+            <a:off x="667407" y="342635"/>
+            <a:ext cx="8213833" cy="1200329"/>
+          </a:xfrm>
+          <a:prstGeom prst="rect">
+            <a:avLst/>
+          </a:prstGeom>
+          <a:noFill/>
+        </p:spPr>
+        <p:txBody>
+          <a:bodyPr wrap="square">
+            <a:spAutoFit/>
+          </a:bodyPr>
+          <a:lstStyle/>
+          <a:p>
+            <a:r>
+              <a:rPr lang="en-US" sz="3600" b="1" dirty="0">
+                <a:solidFill>
+                  <a:srgbClr val="FE5722"/>
+                </a:solidFill>
+              </a:rPr>
+              <a:t>Key features of the app (which are already implemented)</a:t>
+            </a:r>
+            <a:endParaRPr lang="en-US" sz="3600" dirty="0"/>
+          </a:p>
+        </p:txBody>
+      </p:sp>
+    </p:spTree>
+    <p:extLst>
+      <p:ext uri="{BB962C8B-B14F-4D97-AF65-F5344CB8AC3E}">
+        <p14:creationId xmlns:p14="http://schemas.microsoft.com/office/powerpoint/2010/main" val="2598676710"/>
+      </p:ext>
+    </p:extLst>
+  </p:cSld>
+  <p:clrMapOvr>
+    <a:masterClrMapping/>
+  </p:clrMapOvr>
+</p:sld>
+</file>
+
+<file path=ppt/slides/slide4.xml><?xml version="1.0" encoding="utf-8"?>
+<p:sld xmlns:a="http://schemas.openxmlformats.org/drawingml/2006/main" xmlns:r="http://schemas.openxmlformats.org/officeDocument/2006/relationships" xmlns:p="http://schemas.openxmlformats.org/presentationml/2006/main">
+  <p:cSld>
+    <p:spTree>
+      <p:nvGrpSpPr>
+        <p:cNvPr id="1" name=""/>
+        <p:cNvGrpSpPr/>
+        <p:nvPr/>
+      </p:nvGrpSpPr>
+      <p:grpSpPr>
+        <a:xfrm>
+          <a:off x="0" y="0"/>
+          <a:ext cx="0" cy="0"/>
+          <a:chOff x="0" y="0"/>
+          <a:chExt cx="0" cy="0"/>
+        </a:xfrm>
+      </p:grpSpPr>
+      <p:pic>
+        <p:nvPicPr>
+          <p:cNvPr id="5" name="Picture 4">
+            <a:extLst>
+              <a:ext uri="{FF2B5EF4-FFF2-40B4-BE49-F238E27FC236}">
+                <a16:creationId xmlns:a16="http://schemas.microsoft.com/office/drawing/2014/main" id="{127A0D81-AFD7-9612-B21F-3DCB85A50507}"/>
+              </a:ext>
+            </a:extLst>
+          </p:cNvPr>
+          <p:cNvPicPr>
+            <a:picLocks noChangeAspect="1"/>
+          </p:cNvPicPr>
+          <p:nvPr/>
+        </p:nvPicPr>
+        <p:blipFill>
+          <a:blip r:embed="rId2"/>
+          <a:stretch>
+            <a:fillRect/>
+          </a:stretch>
+        </p:blipFill>
+        <p:spPr>
+          <a:xfrm>
+            <a:off x="2322786" y="1644236"/>
+            <a:ext cx="2711157" cy="5213764"/>
+          </a:xfrm>
+          <a:prstGeom prst="rect">
+            <a:avLst/>
+          </a:prstGeom>
+        </p:spPr>
+      </p:pic>
+      <p:sp>
+        <p:nvSpPr>
+          <p:cNvPr id="6" name="TextBox 5">
+            <a:extLst>
+              <a:ext uri="{FF2B5EF4-FFF2-40B4-BE49-F238E27FC236}">
+                <a16:creationId xmlns:a16="http://schemas.microsoft.com/office/drawing/2014/main" id="{A9161B7D-3778-64B0-B795-1E66D3EC11D5}"/>
+              </a:ext>
+            </a:extLst>
+          </p:cNvPr>
+          <p:cNvSpPr txBox="1"/>
+          <p:nvPr/>
+        </p:nvSpPr>
+        <p:spPr>
+          <a:xfrm>
+            <a:off x="651149" y="367861"/>
+            <a:ext cx="5444359" cy="646331"/>
+          </a:xfrm>
+          <a:prstGeom prst="rect">
+            <a:avLst/>
+          </a:prstGeom>
+          <a:noFill/>
+        </p:spPr>
+        <p:txBody>
+          <a:bodyPr wrap="square" rtlCol="0">
+            <a:spAutoFit/>
+          </a:bodyPr>
+          <a:lstStyle/>
+          <a:p>
+            <a:r>
+              <a:rPr lang="en-US" sz="3600" dirty="0">
+                <a:solidFill>
+                  <a:srgbClr val="FE5722"/>
+                </a:solidFill>
+              </a:rPr>
+              <a:t>Login page :</a:t>
+            </a:r>
+          </a:p>
+        </p:txBody>
+      </p:sp>
+      <p:pic>
+        <p:nvPicPr>
+          <p:cNvPr id="8" name="Picture 7">
+            <a:extLst>
+              <a:ext uri="{FF2B5EF4-FFF2-40B4-BE49-F238E27FC236}">
+                <a16:creationId xmlns:a16="http://schemas.microsoft.com/office/drawing/2014/main" id="{6CA3D976-8404-CCBB-CBB3-41A7A5676EA3}"/>
+              </a:ext>
+            </a:extLst>
+          </p:cNvPr>
+          <p:cNvPicPr>
+            <a:picLocks noChangeAspect="1"/>
+          </p:cNvPicPr>
+          <p:nvPr/>
+        </p:nvPicPr>
+        <p:blipFill>
+          <a:blip r:embed="rId3"/>
+          <a:stretch>
+            <a:fillRect/>
+          </a:stretch>
+        </p:blipFill>
+        <p:spPr>
+          <a:xfrm>
+            <a:off x="6590756" y="1644236"/>
+            <a:ext cx="2711157" cy="5213764"/>
+          </a:xfrm>
+          <a:prstGeom prst="rect">
+            <a:avLst/>
+          </a:prstGeom>
+        </p:spPr>
+      </p:pic>
+      <p:pic>
+        <p:nvPicPr>
+          <p:cNvPr id="10" name="Picture 9">
+            <a:extLst>
+              <a:ext uri="{FF2B5EF4-FFF2-40B4-BE49-F238E27FC236}">
+                <a16:creationId xmlns:a16="http://schemas.microsoft.com/office/drawing/2014/main" id="{7182F983-2A0E-36FB-552D-D6AF4D18F48A}"/>
+              </a:ext>
+            </a:extLst>
+          </p:cNvPr>
+          <p:cNvPicPr>
+            <a:picLocks noChangeAspect="1"/>
+          </p:cNvPicPr>
+          <p:nvPr/>
+        </p:nvPicPr>
+        <p:blipFill>
+          <a:blip r:embed="rId4"/>
+          <a:stretch>
+            <a:fillRect/>
+          </a:stretch>
+        </p:blipFill>
+        <p:spPr>
+          <a:xfrm>
+            <a:off x="6590756" y="1602106"/>
+            <a:ext cx="2711157" cy="5255894"/>
+          </a:xfrm>
+          <a:prstGeom prst="rect">
+            <a:avLst/>
+          </a:prstGeom>
+        </p:spPr>
+      </p:pic>
+      <p:sp>
+        <p:nvSpPr>
+          <p:cNvPr id="11" name="Arrow: Right 10">
+            <a:extLst>
+              <a:ext uri="{FF2B5EF4-FFF2-40B4-BE49-F238E27FC236}">
+                <a16:creationId xmlns:a16="http://schemas.microsoft.com/office/drawing/2014/main" id="{D5FF1699-74C8-1041-5C48-9C8248F6F21D}"/>
+              </a:ext>
+            </a:extLst>
+          </p:cNvPr>
+          <p:cNvSpPr/>
+          <p:nvPr/>
+        </p:nvSpPr>
+        <p:spPr>
+          <a:xfrm rot="8716375">
+            <a:off x="4355277" y="6155704"/>
+            <a:ext cx="501868" cy="210207"/>
+          </a:xfrm>
+          <a:prstGeom prst="rightArrow">
+            <a:avLst/>
+          </a:prstGeom>
+          <a:solidFill>
+            <a:schemeClr val="tx1"/>
+          </a:solidFill>
+          <a:ln>
+            <a:solidFill>
+              <a:schemeClr val="tx1"/>
+            </a:solidFill>
+          </a:ln>
+        </p:spPr>
+        <p:style>
+          <a:lnRef idx="2">
+            <a:schemeClr val="accent1">
+              <a:shade val="50000"/>
+            </a:schemeClr>
+          </a:lnRef>
+          <a:fillRef idx="1">
+            <a:schemeClr val="accent1"/>
+          </a:fillRef>
+          <a:effectRef idx="0">
+            <a:schemeClr val="accent1"/>
+          </a:effectRef>
+          <a:fontRef idx="minor">
+            <a:schemeClr val="lt1"/>
+          </a:fontRef>
+        </p:style>
+        <p:txBody>
+          <a:bodyPr rtlCol="0" anchor="ctr"/>
+          <a:lstStyle/>
+          <a:p>
+            <a:pPr algn="ctr"/>
+            <a:endParaRPr lang="en-US"/>
+          </a:p>
+        </p:txBody>
+      </p:sp>
+      <p:sp>
+        <p:nvSpPr>
+          <p:cNvPr id="12" name="Arrow: Right 11">
+            <a:extLst>
+              <a:ext uri="{FF2B5EF4-FFF2-40B4-BE49-F238E27FC236}">
+                <a16:creationId xmlns:a16="http://schemas.microsoft.com/office/drawing/2014/main" id="{D801BB7D-36F6-A550-9A67-AD5419C2C6D5}"/>
+              </a:ext>
+            </a:extLst>
+          </p:cNvPr>
+          <p:cNvSpPr/>
+          <p:nvPr/>
+        </p:nvSpPr>
+        <p:spPr>
+          <a:xfrm rot="8716375">
+            <a:off x="4520274" y="4933777"/>
+            <a:ext cx="501868" cy="210207"/>
+          </a:xfrm>
+          <a:prstGeom prst="rightArrow">
+            <a:avLst/>
+          </a:prstGeom>
+          <a:solidFill>
+            <a:schemeClr val="tx1"/>
+          </a:solidFill>
+          <a:ln>
+            <a:solidFill>
+              <a:schemeClr val="tx1"/>
+            </a:solidFill>
+          </a:ln>
+        </p:spPr>
+        <p:style>
+          <a:lnRef idx="2">
+            <a:schemeClr val="accent1">
+              <a:shade val="50000"/>
+            </a:schemeClr>
+          </a:lnRef>
+          <a:fillRef idx="1">
+            <a:schemeClr val="accent1"/>
+          </a:fillRef>
+          <a:effectRef idx="0">
+            <a:schemeClr val="accent1"/>
+          </a:effectRef>
+          <a:fontRef idx="minor">
+            <a:schemeClr val="lt1"/>
+          </a:fontRef>
+        </p:style>
+        <p:txBody>
+          <a:bodyPr rtlCol="0" anchor="ctr"/>
+          <a:lstStyle/>
+          <a:p>
+            <a:pPr algn="ctr"/>
+            <a:endParaRPr lang="en-US"/>
+          </a:p>
+        </p:txBody>
+      </p:sp>
+      <p:pic>
+        <p:nvPicPr>
+          <p:cNvPr id="14" name="Picture 13">
+            <a:extLst>
+              <a:ext uri="{FF2B5EF4-FFF2-40B4-BE49-F238E27FC236}">
+                <a16:creationId xmlns:a16="http://schemas.microsoft.com/office/drawing/2014/main" id="{A34836C0-AD8A-A1F7-A847-02E5B78F3DE7}"/>
+              </a:ext>
+            </a:extLst>
+          </p:cNvPr>
+          <p:cNvPicPr>
+            <a:picLocks noChangeAspect="1"/>
+          </p:cNvPicPr>
+          <p:nvPr/>
+        </p:nvPicPr>
+        <p:blipFill>
+          <a:blip r:embed="rId5"/>
+          <a:stretch>
+            <a:fillRect/>
+          </a:stretch>
+        </p:blipFill>
+        <p:spPr>
+          <a:xfrm>
+            <a:off x="6587380" y="1508129"/>
+            <a:ext cx="2753771" cy="5289107"/>
+          </a:xfrm>
+          <a:prstGeom prst="rect">
+            <a:avLst/>
+          </a:prstGeom>
+        </p:spPr>
+      </p:pic>
+      <p:sp>
+        <p:nvSpPr>
+          <p:cNvPr id="15" name="Arrow: Right 14">
+            <a:extLst>
+              <a:ext uri="{FF2B5EF4-FFF2-40B4-BE49-F238E27FC236}">
+                <a16:creationId xmlns:a16="http://schemas.microsoft.com/office/drawing/2014/main" id="{7698374F-A611-7E39-7B21-5DCA0280E20E}"/>
+              </a:ext>
+            </a:extLst>
+          </p:cNvPr>
+          <p:cNvSpPr/>
+          <p:nvPr/>
+        </p:nvSpPr>
+        <p:spPr>
+          <a:xfrm rot="8716375">
+            <a:off x="3144521" y="4704445"/>
+            <a:ext cx="501868" cy="210207"/>
+          </a:xfrm>
+          <a:prstGeom prst="rightArrow">
+            <a:avLst/>
+          </a:prstGeom>
+          <a:solidFill>
+            <a:schemeClr val="tx1"/>
+          </a:solidFill>
+          <a:ln>
+            <a:solidFill>
+              <a:schemeClr val="tx1"/>
+            </a:solidFill>
+          </a:ln>
+        </p:spPr>
+        <p:style>
+          <a:lnRef idx="2">
+            <a:schemeClr val="accent1">
+              <a:shade val="50000"/>
+            </a:schemeClr>
+          </a:lnRef>
+          <a:fillRef idx="1">
+            <a:schemeClr val="accent1"/>
+          </a:fillRef>
+          <a:effectRef idx="0">
+            <a:schemeClr val="accent1"/>
+          </a:effectRef>
+          <a:fontRef idx="minor">
+            <a:schemeClr val="lt1"/>
+          </a:fontRef>
+        </p:style>
+        <p:txBody>
+          <a:bodyPr rtlCol="0" anchor="ctr"/>
+          <a:lstStyle/>
+          <a:p>
+            <a:pPr algn="ctr"/>
+            <a:endParaRPr lang="en-US"/>
+          </a:p>
+        </p:txBody>
+      </p:sp>
+    </p:spTree>
+    <p:extLst>
+      <p:ext uri="{BB962C8B-B14F-4D97-AF65-F5344CB8AC3E}">
+        <p14:creationId xmlns:p14="http://schemas.microsoft.com/office/powerpoint/2010/main" val="1038761493"/>
+      </p:ext>
+    </p:extLst>
+  </p:cSld>
+  <p:clrMapOvr>
+    <a:masterClrMapping/>
+  </p:clrMapOvr>
+  <p:timing>
+    <p:tnLst>
+      <p:par>
+        <p:cTn id="1" dur="indefinite" restart="never" nodeType="tmRoot">
+          <p:childTnLst>
+            <p:seq concurrent="1" nextAc="seek">
+              <p:cTn id="2" dur="indefinite" nodeType="mainSeq">
+                <p:childTnLst>
+                  <p:par>
+                    <p:cTn id="3" fill="hold">
+                      <p:stCondLst>
+                        <p:cond delay="indefinite"/>
+                      </p:stCondLst>
+                      <p:childTnLst>
+                        <p:par>
+                          <p:cTn id="4" fill="hold">
+                            <p:stCondLst>
+                              <p:cond delay="0"/>
+                            </p:stCondLst>
+                            <p:childTnLst>
+                              <p:par>
+                                <p:cTn id="5" presetID="2" presetClass="entr" presetSubtype="4" fill="hold" grpId="0" nodeType="clickEffect">
+                                  <p:stCondLst>
+                                    <p:cond delay="0"/>
+                                  </p:stCondLst>
+                                  <p:childTnLst>
+                                    <p:set>
+                                      <p:cBhvr>
+                                        <p:cTn id="6" dur="1" fill="hold">
+                                          <p:stCondLst>
+                                            <p:cond delay="0"/>
+                                          </p:stCondLst>
+                                        </p:cTn>
+                                        <p:tgtEl>
+                                          <p:spTgt spid="11"/>
+                                        </p:tgtEl>
+                                        <p:attrNameLst>
+                                          <p:attrName>style.visibility</p:attrName>
+                                        </p:attrNameLst>
+                                      </p:cBhvr>
+                                      <p:to>
+                                        <p:strVal val="visible"/>
+                                      </p:to>
+                                    </p:set>
+                                    <p:anim calcmode="lin" valueType="num">
+                                      <p:cBhvr additive="base">
+                                        <p:cTn id="7" dur="500" fill="hold"/>
+                                        <p:tgtEl>
+                                          <p:spTgt spid="11"/>
+                                        </p:tgtEl>
+                                        <p:attrNameLst>
+                                          <p:attrName>ppt_x</p:attrName>
+                                        </p:attrNameLst>
+                                      </p:cBhvr>
+                                      <p:tavLst>
+                                        <p:tav tm="0">
+                                          <p:val>
+                                            <p:strVal val="#ppt_x"/>
+                                          </p:val>
+                                        </p:tav>
+                                        <p:tav tm="100000">
+                                          <p:val>
+                                            <p:strVal val="#ppt_x"/>
+                                          </p:val>
+                                        </p:tav>
+                                      </p:tavLst>
+                                    </p:anim>
+                                    <p:anim calcmode="lin" valueType="num">
+                                      <p:cBhvr additive="base">
+                                        <p:cTn id="8" dur="500" fill="hold"/>
+                                        <p:tgtEl>
+                                          <p:spTgt spid="11"/>
+                                        </p:tgtEl>
+                                        <p:attrNameLst>
+                                          <p:attrName>ppt_y</p:attrName>
+                                        </p:attrNameLst>
+                                      </p:cBhvr>
+                                      <p:tavLst>
+                                        <p:tav tm="0">
+                                          <p:val>
+                                            <p:strVal val="1+#ppt_h/2"/>
+                                          </p:val>
+                                        </p:tav>
+                                        <p:tav tm="100000">
+                                          <p:val>
+                                            <p:strVal val="#ppt_y"/>
+                                          </p:val>
+                                        </p:tav>
+                                      </p:tavLst>
+                                    </p:anim>
+                                  </p:childTnLst>
+                                </p:cTn>
+                              </p:par>
+                            </p:childTnLst>
+                          </p:cTn>
+                        </p:par>
+                      </p:childTnLst>
+                    </p:cTn>
+                  </p:par>
+                  <p:par>
+                    <p:cTn id="9" fill="hold">
+                      <p:stCondLst>
+                        <p:cond delay="indefinite"/>
+                      </p:stCondLst>
+                      <p:childTnLst>
+                        <p:par>
+                          <p:cTn id="10" fill="hold">
+                            <p:stCondLst>
+                              <p:cond delay="0"/>
+                            </p:stCondLst>
+                            <p:childTnLst>
+                              <p:par>
+                                <p:cTn id="11" presetID="10" presetClass="entr" presetSubtype="0" fill="hold" nodeType="clickEffect">
+                                  <p:stCondLst>
+                                    <p:cond delay="0"/>
+                                  </p:stCondLst>
+                                  <p:childTnLst>
+                                    <p:set>
+                                      <p:cBhvr>
+                                        <p:cTn id="12" dur="1" fill="hold">
+                                          <p:stCondLst>
+                                            <p:cond delay="0"/>
+                                          </p:stCondLst>
+                                        </p:cTn>
+                                        <p:tgtEl>
+                                          <p:spTgt spid="8"/>
+                                        </p:tgtEl>
+                                        <p:attrNameLst>
+                                          <p:attrName>style.visibility</p:attrName>
+                                        </p:attrNameLst>
+                                      </p:cBhvr>
+                                      <p:to>
+                                        <p:strVal val="visible"/>
+                                      </p:to>
+                                    </p:set>
+                                    <p:animEffect transition="in" filter="fade">
+                                      <p:cBhvr>
+                                        <p:cTn id="13" dur="500"/>
+                                        <p:tgtEl>
+                                          <p:spTgt spid="8"/>
+                                        </p:tgtEl>
+                                      </p:cBhvr>
+                                    </p:animEffect>
+                                  </p:childTnLst>
+                                </p:cTn>
+                              </p:par>
+                            </p:childTnLst>
+                          </p:cTn>
+                        </p:par>
+                      </p:childTnLst>
+                    </p:cTn>
+                  </p:par>
+                  <p:par>
+                    <p:cTn id="14" fill="hold">
+                      <p:stCondLst>
+                        <p:cond delay="indefinite"/>
+                      </p:stCondLst>
+                      <p:childTnLst>
+                        <p:par>
+                          <p:cTn id="15" fill="hold">
+                            <p:stCondLst>
+                              <p:cond delay="0"/>
+                            </p:stCondLst>
+                            <p:childTnLst>
+                              <p:par>
+                                <p:cTn id="16" presetID="2" presetClass="entr" presetSubtype="4" fill="hold" grpId="0" nodeType="clickEffect">
+                                  <p:stCondLst>
+                                    <p:cond delay="0"/>
+                                  </p:stCondLst>
+                                  <p:childTnLst>
+                                    <p:set>
+                                      <p:cBhvr>
+                                        <p:cTn id="17" dur="1" fill="hold">
+                                          <p:stCondLst>
+                                            <p:cond delay="0"/>
+                                          </p:stCondLst>
+                                        </p:cTn>
+                                        <p:tgtEl>
+                                          <p:spTgt spid="12"/>
+                                        </p:tgtEl>
+                                        <p:attrNameLst>
+                                          <p:attrName>style.visibility</p:attrName>
+                                        </p:attrNameLst>
+                                      </p:cBhvr>
+                                      <p:to>
+                                        <p:strVal val="visible"/>
+                                      </p:to>
+                                    </p:set>
+                                    <p:anim calcmode="lin" valueType="num">
+                                      <p:cBhvr additive="base">
+                                        <p:cTn id="18" dur="500" fill="hold"/>
+                                        <p:tgtEl>
+                                          <p:spTgt spid="12"/>
+                                        </p:tgtEl>
+                                        <p:attrNameLst>
+                                          <p:attrName>ppt_x</p:attrName>
+                                        </p:attrNameLst>
+                                      </p:cBhvr>
+                                      <p:tavLst>
+                                        <p:tav tm="0">
+                                          <p:val>
+                                            <p:strVal val="#ppt_x"/>
+                                          </p:val>
+                                        </p:tav>
+                                        <p:tav tm="100000">
+                                          <p:val>
+                                            <p:strVal val="#ppt_x"/>
+                                          </p:val>
+                                        </p:tav>
+                                      </p:tavLst>
+                                    </p:anim>
+                                    <p:anim calcmode="lin" valueType="num">
+                                      <p:cBhvr additive="base">
+                                        <p:cTn id="19" dur="500" fill="hold"/>
+                                        <p:tgtEl>
+                                          <p:spTgt spid="12"/>
+                                        </p:tgtEl>
+                                        <p:attrNameLst>
+                                          <p:attrName>ppt_y</p:attrName>
+                                        </p:attrNameLst>
+                                      </p:cBhvr>
+                                      <p:tavLst>
+                                        <p:tav tm="0">
+                                          <p:val>
+                                            <p:strVal val="1+#ppt_h/2"/>
+                                          </p:val>
+                                        </p:tav>
+                                        <p:tav tm="100000">
+                                          <p:val>
+                                            <p:strVal val="#ppt_y"/>
+                                          </p:val>
+                                        </p:tav>
+                                      </p:tavLst>
+                                    </p:anim>
+                                  </p:childTnLst>
+                                </p:cTn>
+                              </p:par>
+                            </p:childTnLst>
+                          </p:cTn>
+                        </p:par>
+                      </p:childTnLst>
+                    </p:cTn>
+                  </p:par>
+                  <p:par>
+                    <p:cTn id="20" fill="hold">
+                      <p:stCondLst>
+                        <p:cond delay="indefinite"/>
+                      </p:stCondLst>
+                      <p:childTnLst>
+                        <p:par>
+                          <p:cTn id="21" fill="hold">
+                            <p:stCondLst>
+                              <p:cond delay="0"/>
+                            </p:stCondLst>
+                            <p:childTnLst>
+                              <p:par>
+                                <p:cTn id="22" presetID="10" presetClass="entr" presetSubtype="0" fill="hold" nodeType="clickEffect">
+                                  <p:stCondLst>
+                                    <p:cond delay="0"/>
+                                  </p:stCondLst>
+                                  <p:childTnLst>
+                                    <p:set>
+                                      <p:cBhvr>
+                                        <p:cTn id="23" dur="1" fill="hold">
+                                          <p:stCondLst>
+                                            <p:cond delay="0"/>
+                                          </p:stCondLst>
+                                        </p:cTn>
+                                        <p:tgtEl>
+                                          <p:spTgt spid="10"/>
+                                        </p:tgtEl>
+                                        <p:attrNameLst>
+                                          <p:attrName>style.visibility</p:attrName>
+                                        </p:attrNameLst>
+                                      </p:cBhvr>
+                                      <p:to>
+                                        <p:strVal val="visible"/>
+                                      </p:to>
+                                    </p:set>
+                                    <p:animEffect transition="in" filter="fade">
+                                      <p:cBhvr>
+                                        <p:cTn id="24" dur="500"/>
+                                        <p:tgtEl>
+                                          <p:spTgt spid="10"/>
+                                        </p:tgtEl>
+                                      </p:cBhvr>
+                                    </p:animEffect>
+                                  </p:childTnLst>
+                                </p:cTn>
+                              </p:par>
+                            </p:childTnLst>
+                          </p:cTn>
+                        </p:par>
+                      </p:childTnLst>
+                    </p:cTn>
+                  </p:par>
+                  <p:par>
+                    <p:cTn id="25" fill="hold">
+                      <p:stCondLst>
+                        <p:cond delay="indefinite"/>
+                      </p:stCondLst>
+                      <p:childTnLst>
+                        <p:par>
+                          <p:cTn id="26" fill="hold">
+                            <p:stCondLst>
+                              <p:cond delay="0"/>
+                            </p:stCondLst>
+                            <p:childTnLst>
+                              <p:par>
+                                <p:cTn id="27" presetID="2" presetClass="entr" presetSubtype="4" fill="hold" grpId="0" nodeType="clickEffect">
+                                  <p:stCondLst>
+                                    <p:cond delay="0"/>
+                                  </p:stCondLst>
+                                  <p:childTnLst>
+                                    <p:set>
+                                      <p:cBhvr>
+                                        <p:cTn id="28" dur="1" fill="hold">
+                                          <p:stCondLst>
+                                            <p:cond delay="0"/>
+                                          </p:stCondLst>
+                                        </p:cTn>
+                                        <p:tgtEl>
+                                          <p:spTgt spid="15"/>
+                                        </p:tgtEl>
+                                        <p:attrNameLst>
+                                          <p:attrName>style.visibility</p:attrName>
+                                        </p:attrNameLst>
+                                      </p:cBhvr>
+                                      <p:to>
+                                        <p:strVal val="visible"/>
+                                      </p:to>
+                                    </p:set>
+                                    <p:anim calcmode="lin" valueType="num">
+                                      <p:cBhvr additive="base">
+                                        <p:cTn id="29" dur="500" fill="hold"/>
+                                        <p:tgtEl>
+                                          <p:spTgt spid="15"/>
+                                        </p:tgtEl>
+                                        <p:attrNameLst>
+                                          <p:attrName>ppt_x</p:attrName>
+                                        </p:attrNameLst>
+                                      </p:cBhvr>
+                                      <p:tavLst>
+                                        <p:tav tm="0">
+                                          <p:val>
+                                            <p:strVal val="#ppt_x"/>
+                                          </p:val>
+                                        </p:tav>
+                                        <p:tav tm="100000">
+                                          <p:val>
+                                            <p:strVal val="#ppt_x"/>
+                                          </p:val>
+                                        </p:tav>
+                                      </p:tavLst>
+                                    </p:anim>
+                                    <p:anim calcmode="lin" valueType="num">
+                                      <p:cBhvr additive="base">
+                                        <p:cTn id="30" dur="500" fill="hold"/>
+                                        <p:tgtEl>
+                                          <p:spTgt spid="15"/>
+                                        </p:tgtEl>
+                                        <p:attrNameLst>
+                                          <p:attrName>ppt_y</p:attrName>
+                                        </p:attrNameLst>
+                                      </p:cBhvr>
+                                      <p:tavLst>
+                                        <p:tav tm="0">
+                                          <p:val>
+                                            <p:strVal val="1+#ppt_h/2"/>
+                                          </p:val>
+                                        </p:tav>
+                                        <p:tav tm="100000">
+                                          <p:val>
+                                            <p:strVal val="#ppt_y"/>
+                                          </p:val>
+                                        </p:tav>
+                                      </p:tavLst>
+                                    </p:anim>
+                                  </p:childTnLst>
+                                </p:cTn>
+                              </p:par>
+                            </p:childTnLst>
+                          </p:cTn>
+                        </p:par>
+                      </p:childTnLst>
+                    </p:cTn>
+                  </p:par>
+                  <p:par>
+                    <p:cTn id="31" fill="hold">
+                      <p:stCondLst>
+                        <p:cond delay="indefinite"/>
+                      </p:stCondLst>
+                      <p:childTnLst>
+                        <p:par>
+                          <p:cTn id="32" fill="hold">
+                            <p:stCondLst>
+                              <p:cond delay="0"/>
+                            </p:stCondLst>
+                            <p:childTnLst>
+                              <p:par>
+                                <p:cTn id="33" presetID="10" presetClass="entr" presetSubtype="0" fill="hold" nodeType="clickEffect">
+                                  <p:stCondLst>
+                                    <p:cond delay="0"/>
+                                  </p:stCondLst>
+                                  <p:childTnLst>
+                                    <p:set>
+                                      <p:cBhvr>
+                                        <p:cTn id="34" dur="1" fill="hold">
+                                          <p:stCondLst>
+                                            <p:cond delay="0"/>
+                                          </p:stCondLst>
+                                        </p:cTn>
+                                        <p:tgtEl>
+                                          <p:spTgt spid="14"/>
+                                        </p:tgtEl>
+                                        <p:attrNameLst>
+                                          <p:attrName>style.visibility</p:attrName>
+                                        </p:attrNameLst>
+                                      </p:cBhvr>
+                                      <p:to>
+                                        <p:strVal val="visible"/>
+                                      </p:to>
+                                    </p:set>
+                                    <p:animEffect transition="in" filter="fade">
+                                      <p:cBhvr>
+                                        <p:cTn id="35" dur="500"/>
+                                        <p:tgtEl>
+                                          <p:spTgt spid="14"/>
+                                        </p:tgtEl>
+                                      </p:cBhvr>
+                                    </p:animEffect>
+                                  </p:childTnLst>
+                                </p:cTn>
+                              </p:par>
+                            </p:childTnLst>
+                          </p:cTn>
+                        </p:par>
+                      </p:childTnLst>
+                    </p:cTn>
+                  </p:par>
+                </p:childTnLst>
+              </p:cTn>
+              <p:prevCondLst>
+                <p:cond evt="onPrev" delay="0">
+                  <p:tgtEl>
+                    <p:sldTgt/>
+                  </p:tgtEl>
+                </p:cond>
+              </p:prevCondLst>
+              <p:nextCondLst>
+                <p:cond evt="onNext" delay="0">
+                  <p:tgtEl>
+                    <p:sldTgt/>
+                  </p:tgtEl>
+                </p:cond>
+              </p:nextCondLst>
+            </p:seq>
+          </p:childTnLst>
+        </p:cTn>
+      </p:par>
+    </p:tnLst>
+    <p:bldLst>
+      <p:bldP spid="11" grpId="0" animBg="1"/>
+      <p:bldP spid="12" grpId="0" animBg="1"/>
+      <p:bldP spid="15" grpId="0" animBg="1"/>
+    </p:bldLst>
+  </p:timing>
+</p:sld>
+</file>
+
+<file path=ppt/slides/slide5.xml><?xml version="1.0" encoding="utf-8"?>
+<p:sld xmlns:a="http://schemas.openxmlformats.org/drawingml/2006/main" xmlns:r="http://schemas.openxmlformats.org/officeDocument/2006/relationships" xmlns:p="http://schemas.openxmlformats.org/presentationml/2006/main">
+  <p:cSld>
+    <p:spTree>
+      <p:nvGrpSpPr>
+        <p:cNvPr id="1" name=""/>
+        <p:cNvGrpSpPr/>
+        <p:nvPr/>
+      </p:nvGrpSpPr>
+      <p:grpSpPr>
+        <a:xfrm>
+          <a:off x="0" y="0"/>
+          <a:ext cx="0" cy="0"/>
+          <a:chOff x="0" y="0"/>
+          <a:chExt cx="0" cy="0"/>
+        </a:xfrm>
+      </p:grpSpPr>
+      <p:sp>
+        <p:nvSpPr>
+          <p:cNvPr id="7" name="TextBox 6">
+            <a:extLst>
+              <a:ext uri="{FF2B5EF4-FFF2-40B4-BE49-F238E27FC236}">
+                <a16:creationId xmlns:a16="http://schemas.microsoft.com/office/drawing/2014/main" id="{BFFF5A1D-FC97-74DC-1843-8EBD2B4B49C2}"/>
+              </a:ext>
+            </a:extLst>
+          </p:cNvPr>
+          <p:cNvSpPr txBox="1"/>
+          <p:nvPr/>
+        </p:nvSpPr>
+        <p:spPr>
+          <a:xfrm>
+            <a:off x="168164" y="1013221"/>
+            <a:ext cx="6096000" cy="2308324"/>
+          </a:xfrm>
+          <a:prstGeom prst="rect">
+            <a:avLst/>
+          </a:prstGeom>
+          <a:noFill/>
+        </p:spPr>
+        <p:txBody>
+          <a:bodyPr wrap="square">
+            <a:spAutoFit/>
+          </a:bodyPr>
+          <a:lstStyle/>
+          <a:p>
+            <a:pPr algn="l">
+              <a:buFont typeface="Arial" panose="020B0604020202020204" pitchFamily="34" charset="0"/>
+              <a:buChar char="•"/>
+            </a:pPr>
+            <a:r>
+              <a:rPr lang="en-US" dirty="0">
+                <a:latin typeface="-apple-system"/>
+              </a:rPr>
+              <a:t>Add new category, give it a name, </a:t>
+            </a:r>
+            <a:r>
+              <a:rPr lang="en-US" b="0" i="0" dirty="0">
+                <a:effectLst/>
+                <a:latin typeface="-apple-system"/>
+              </a:rPr>
+              <a:t>description and image.</a:t>
+            </a:r>
+            <a:br>
+              <a:rPr lang="en-US" b="0" i="0" dirty="0">
+                <a:effectLst/>
+                <a:latin typeface="-apple-system"/>
+              </a:rPr>
+            </a:br>
+            <a:endParaRPr lang="en-US" b="0" i="0" dirty="0">
+              <a:effectLst/>
+              <a:latin typeface="-apple-system"/>
+            </a:endParaRPr>
+          </a:p>
+          <a:p>
+            <a:pPr algn="l">
+              <a:buFont typeface="Arial" panose="020B0604020202020204" pitchFamily="34" charset="0"/>
+              <a:buChar char="•"/>
+            </a:pPr>
+            <a:r>
+              <a:rPr lang="en-US" b="0" i="0" dirty="0">
+                <a:effectLst/>
+                <a:latin typeface="-apple-system"/>
+              </a:rPr>
+              <a:t>Make a category private or public and associate it with tags.</a:t>
+            </a:r>
+          </a:p>
+          <a:p>
+            <a:pPr>
+              <a:buFont typeface="Arial" panose="020B0604020202020204" pitchFamily="34" charset="0"/>
+              <a:buChar char="•"/>
+            </a:pPr>
+            <a:endParaRPr lang="en-US" dirty="0">
+              <a:latin typeface="-apple-system"/>
+            </a:endParaRPr>
+          </a:p>
+          <a:p>
+            <a:pPr>
+              <a:buFont typeface="Arial" panose="020B0604020202020204" pitchFamily="34" charset="0"/>
+              <a:buChar char="•"/>
+            </a:pPr>
+            <a:r>
+              <a:rPr lang="en-US" b="0" i="0" dirty="0">
+                <a:effectLst/>
+                <a:latin typeface="-apple-system"/>
+              </a:rPr>
+              <a:t>Sort categories manually by dragging an item.</a:t>
+            </a:r>
+            <a:br>
+              <a:rPr lang="en-US" b="0" i="0" dirty="0">
+                <a:effectLst/>
+                <a:latin typeface="-apple-system"/>
+              </a:rPr>
+            </a:br>
+            <a:endParaRPr lang="en-US" b="0" i="0" dirty="0">
+              <a:effectLst/>
+              <a:latin typeface="-apple-system"/>
+            </a:endParaRPr>
+          </a:p>
+          <a:p>
+            <a:pPr>
+              <a:buFont typeface="Arial" panose="020B0604020202020204" pitchFamily="34" charset="0"/>
+              <a:buChar char="•"/>
+            </a:pPr>
+            <a:r>
+              <a:rPr lang="en-US" dirty="0">
+                <a:latin typeface="-apple-system"/>
+              </a:rPr>
+              <a:t>Remove a category.</a:t>
+            </a:r>
+            <a:br>
+              <a:rPr lang="en-US" dirty="0">
+                <a:latin typeface="-apple-system"/>
+              </a:rPr>
+            </a:br>
+            <a:endParaRPr lang="en-US" dirty="0">
+              <a:latin typeface="-apple-system"/>
+            </a:endParaRPr>
+          </a:p>
+        </p:txBody>
+      </p:sp>
+      <p:pic>
+        <p:nvPicPr>
+          <p:cNvPr id="6" name="Picture 5">
+            <a:extLst>
+              <a:ext uri="{FF2B5EF4-FFF2-40B4-BE49-F238E27FC236}">
+                <a16:creationId xmlns:a16="http://schemas.microsoft.com/office/drawing/2014/main" id="{A2238CA8-B160-AAA6-595E-28A915AF5151}"/>
+              </a:ext>
+            </a:extLst>
+          </p:cNvPr>
+          <p:cNvPicPr>
+            <a:picLocks noChangeAspect="1"/>
+          </p:cNvPicPr>
+          <p:nvPr/>
+        </p:nvPicPr>
+        <p:blipFill>
+          <a:blip r:embed="rId2"/>
+          <a:stretch>
+            <a:fillRect/>
+          </a:stretch>
+        </p:blipFill>
+        <p:spPr>
+          <a:xfrm>
+            <a:off x="4666549" y="2615707"/>
+            <a:ext cx="2180897" cy="4225488"/>
+          </a:xfrm>
+          <a:prstGeom prst="rect">
+            <a:avLst/>
+          </a:prstGeom>
+        </p:spPr>
+      </p:pic>
+      <p:sp>
+        <p:nvSpPr>
+          <p:cNvPr id="14" name="Arrow: Right 13">
+            <a:extLst>
+              <a:ext uri="{FF2B5EF4-FFF2-40B4-BE49-F238E27FC236}">
+                <a16:creationId xmlns:a16="http://schemas.microsoft.com/office/drawing/2014/main" id="{72B19380-4FFE-B201-52D5-C347A3C1F51E}"/>
+              </a:ext>
+            </a:extLst>
+          </p:cNvPr>
+          <p:cNvSpPr/>
+          <p:nvPr/>
+        </p:nvSpPr>
+        <p:spPr>
+          <a:xfrm rot="5400000">
+            <a:off x="6342746" y="5621738"/>
+            <a:ext cx="501868" cy="210207"/>
+          </a:xfrm>
+          <a:prstGeom prst="rightArrow">
+            <a:avLst/>
+          </a:prstGeom>
+          <a:solidFill>
+            <a:schemeClr val="tx1"/>
+          </a:solidFill>
+          <a:ln>
+            <a:solidFill>
+              <a:schemeClr val="tx1"/>
+            </a:solidFill>
+          </a:ln>
+        </p:spPr>
+        <p:style>
+          <a:lnRef idx="2">
+            <a:schemeClr val="accent1">
+              <a:shade val="50000"/>
+            </a:schemeClr>
+          </a:lnRef>
+          <a:fillRef idx="1">
+            <a:schemeClr val="accent1"/>
+          </a:fillRef>
+          <a:effectRef idx="0">
+            <a:schemeClr val="accent1"/>
+          </a:effectRef>
+          <a:fontRef idx="minor">
+            <a:schemeClr val="lt1"/>
+          </a:fontRef>
+        </p:style>
+        <p:txBody>
+          <a:bodyPr rtlCol="0" anchor="ctr"/>
+          <a:lstStyle/>
+          <a:p>
+            <a:pPr algn="ctr"/>
+            <a:endParaRPr lang="en-US"/>
+          </a:p>
+        </p:txBody>
+      </p:sp>
+      <p:pic>
+        <p:nvPicPr>
+          <p:cNvPr id="17" name="Picture 16">
+            <a:extLst>
+              <a:ext uri="{FF2B5EF4-FFF2-40B4-BE49-F238E27FC236}">
+                <a16:creationId xmlns:a16="http://schemas.microsoft.com/office/drawing/2014/main" id="{A42D8430-A6DF-3AA5-D77C-1E13BB14872D}"/>
+              </a:ext>
+            </a:extLst>
+          </p:cNvPr>
+          <p:cNvPicPr>
+            <a:picLocks noChangeAspect="1"/>
+          </p:cNvPicPr>
+          <p:nvPr/>
+        </p:nvPicPr>
+        <p:blipFill>
+          <a:blip r:embed="rId3"/>
+          <a:stretch>
+            <a:fillRect/>
+          </a:stretch>
+        </p:blipFill>
+        <p:spPr>
+          <a:xfrm>
+            <a:off x="7172776" y="2615708"/>
+            <a:ext cx="2259232" cy="4242292"/>
+          </a:xfrm>
+          <a:prstGeom prst="rect">
+            <a:avLst/>
+          </a:prstGeom>
+        </p:spPr>
+      </p:pic>
+      <p:sp>
+        <p:nvSpPr>
+          <p:cNvPr id="19" name="TextBox 18">
+            <a:extLst>
+              <a:ext uri="{FF2B5EF4-FFF2-40B4-BE49-F238E27FC236}">
+                <a16:creationId xmlns:a16="http://schemas.microsoft.com/office/drawing/2014/main" id="{28430E31-0331-33BB-0232-C4B91100D560}"/>
+              </a:ext>
+            </a:extLst>
+          </p:cNvPr>
+          <p:cNvSpPr txBox="1"/>
+          <p:nvPr/>
+        </p:nvSpPr>
+        <p:spPr>
+          <a:xfrm>
+            <a:off x="168164" y="198637"/>
+            <a:ext cx="6096000" cy="1077218"/>
+          </a:xfrm>
+          <a:prstGeom prst="rect">
+            <a:avLst/>
+          </a:prstGeom>
+          <a:noFill/>
+        </p:spPr>
+        <p:txBody>
+          <a:bodyPr wrap="square">
+            <a:spAutoFit/>
+          </a:bodyPr>
+          <a:lstStyle/>
+          <a:p>
+            <a:r>
+              <a:rPr lang="en-US" sz="3200" b="1" dirty="0">
+                <a:solidFill>
+                  <a:srgbClr val="FE5722"/>
+                </a:solidFill>
+                <a:latin typeface="-apple-system"/>
+              </a:rPr>
+              <a:t> Home page :</a:t>
+            </a:r>
+            <a:br>
+              <a:rPr lang="en-US" sz="3200" b="1" dirty="0">
+                <a:solidFill>
+                  <a:srgbClr val="FE5722"/>
+                </a:solidFill>
+                <a:latin typeface="-apple-system"/>
+              </a:rPr>
+            </a:br>
+            <a:endParaRPr lang="en-US" sz="3200" b="1" dirty="0">
+              <a:solidFill>
+                <a:srgbClr val="FE5722"/>
+              </a:solidFill>
+              <a:latin typeface="-apple-system"/>
+            </a:endParaRPr>
+          </a:p>
+        </p:txBody>
+      </p:sp>
+      <p:pic>
+        <p:nvPicPr>
+          <p:cNvPr id="21" name="Picture 20">
+            <a:extLst>
+              <a:ext uri="{FF2B5EF4-FFF2-40B4-BE49-F238E27FC236}">
+                <a16:creationId xmlns:a16="http://schemas.microsoft.com/office/drawing/2014/main" id="{9F63B2B4-8D03-C29B-4A3D-8DDAA241294E}"/>
+              </a:ext>
+            </a:extLst>
+          </p:cNvPr>
+          <p:cNvPicPr>
+            <a:picLocks noChangeAspect="1"/>
+          </p:cNvPicPr>
+          <p:nvPr/>
+        </p:nvPicPr>
+        <p:blipFill>
+          <a:blip r:embed="rId4"/>
+          <a:stretch>
+            <a:fillRect/>
+          </a:stretch>
+        </p:blipFill>
+        <p:spPr>
+          <a:xfrm>
+            <a:off x="9862574" y="2598903"/>
+            <a:ext cx="2189570" cy="4242292"/>
+          </a:xfrm>
+          <a:prstGeom prst="rect">
+            <a:avLst/>
+          </a:prstGeom>
+        </p:spPr>
+      </p:pic>
+      <p:sp>
+        <p:nvSpPr>
+          <p:cNvPr id="22" name="Arrow: Right 21">
+            <a:extLst>
+              <a:ext uri="{FF2B5EF4-FFF2-40B4-BE49-F238E27FC236}">
+                <a16:creationId xmlns:a16="http://schemas.microsoft.com/office/drawing/2014/main" id="{E995692C-5CDF-6BB6-6FB6-9D441420BF96}"/>
+              </a:ext>
+            </a:extLst>
+          </p:cNvPr>
+          <p:cNvSpPr/>
+          <p:nvPr/>
+        </p:nvSpPr>
+        <p:spPr>
+          <a:xfrm rot="8500746">
+            <a:off x="8944056" y="5711077"/>
+            <a:ext cx="501868" cy="210207"/>
+          </a:xfrm>
+          <a:prstGeom prst="rightArrow">
+            <a:avLst/>
+          </a:prstGeom>
+          <a:solidFill>
+            <a:schemeClr val="tx1"/>
+          </a:solidFill>
+          <a:ln>
+            <a:solidFill>
+              <a:schemeClr val="tx1"/>
+            </a:solidFill>
+          </a:ln>
+        </p:spPr>
+        <p:style>
+          <a:lnRef idx="2">
+            <a:schemeClr val="accent1">
+              <a:shade val="50000"/>
+            </a:schemeClr>
+          </a:lnRef>
+          <a:fillRef idx="1">
+            <a:schemeClr val="accent1"/>
+          </a:fillRef>
+          <a:effectRef idx="0">
+            <a:schemeClr val="accent1"/>
+          </a:effectRef>
+          <a:fontRef idx="minor">
+            <a:schemeClr val="lt1"/>
+          </a:fontRef>
+        </p:style>
+        <p:txBody>
+          <a:bodyPr rtlCol="0" anchor="ctr"/>
+          <a:lstStyle/>
+          <a:p>
+            <a:pPr algn="ctr"/>
+            <a:endParaRPr lang="en-US"/>
+          </a:p>
+        </p:txBody>
+      </p:sp>
+    </p:spTree>
+    <p:extLst>
+      <p:ext uri="{BB962C8B-B14F-4D97-AF65-F5344CB8AC3E}">
+        <p14:creationId xmlns:p14="http://schemas.microsoft.com/office/powerpoint/2010/main" val="520359915"/>
+      </p:ext>
+    </p:extLst>
+  </p:cSld>
+  <p:clrMapOvr>
+    <a:masterClrMapping/>
+  </p:clrMapOvr>
+  <p:timing>
+    <p:tnLst>
+      <p:par>
+        <p:cTn id="1" dur="indefinite" restart="never" nodeType="tmRoot">
+          <p:childTnLst>
+            <p:seq concurrent="1" nextAc="seek">
+              <p:cTn id="2" dur="indefinite" nodeType="mainSeq">
+                <p:childTnLst>
+                  <p:par>
+                    <p:cTn id="3" fill="hold">
+                      <p:stCondLst>
+                        <p:cond delay="indefinite"/>
+                      </p:stCondLst>
+                      <p:childTnLst>
+                        <p:par>
+                          <p:cTn id="4" fill="hold">
+                            <p:stCondLst>
+                              <p:cond delay="0"/>
+                            </p:stCondLst>
+                            <p:childTnLst>
+                              <p:par>
+                                <p:cTn id="5" presetID="27" presetClass="emph" presetSubtype="0" fill="remove" grpId="0" nodeType="clickEffect">
+                                  <p:stCondLst>
+                                    <p:cond delay="0"/>
+                                  </p:stCondLst>
+                                  <p:childTnLst>
+                                    <p:animClr clrSpc="rgb" dir="cw">
+                                      <p:cBhvr override="childStyle">
+                                        <p:cTn id="6" dur="250" autoRev="1" fill="remove"/>
+                                        <p:tgtEl>
+                                          <p:spTgt spid="14"/>
+                                        </p:tgtEl>
+                                        <p:attrNameLst>
+                                          <p:attrName>style.color</p:attrName>
+                                        </p:attrNameLst>
+                                      </p:cBhvr>
+                                      <p:to>
+                                        <a:schemeClr val="bg1"/>
+                                      </p:to>
+                                    </p:animClr>
+                                    <p:animClr clrSpc="rgb" dir="cw">
+                                      <p:cBhvr>
+                                        <p:cTn id="7" dur="250" autoRev="1" fill="remove"/>
+                                        <p:tgtEl>
+                                          <p:spTgt spid="14"/>
+                                        </p:tgtEl>
+                                        <p:attrNameLst>
+                                          <p:attrName>fillcolor</p:attrName>
+                                        </p:attrNameLst>
+                                      </p:cBhvr>
+                                      <p:to>
+                                        <a:schemeClr val="bg1"/>
+                                      </p:to>
+                                    </p:animClr>
+                                    <p:set>
+                                      <p:cBhvr>
+                                        <p:cTn id="8" dur="250" autoRev="1" fill="remove"/>
+                                        <p:tgtEl>
+                                          <p:spTgt spid="14"/>
+                                        </p:tgtEl>
+                                        <p:attrNameLst>
+                                          <p:attrName>fill.type</p:attrName>
+                                        </p:attrNameLst>
+                                      </p:cBhvr>
+                                      <p:to>
+                                        <p:strVal val="solid"/>
+                                      </p:to>
+                                    </p:set>
+                                    <p:set>
+                                      <p:cBhvr>
+                                        <p:cTn id="9" dur="250" autoRev="1" fill="remove"/>
+                                        <p:tgtEl>
+                                          <p:spTgt spid="14"/>
+                                        </p:tgtEl>
+                                        <p:attrNameLst>
+                                          <p:attrName>fill.on</p:attrName>
+                                        </p:attrNameLst>
+                                      </p:cBhvr>
+                                      <p:to>
+                                        <p:strVal val="true"/>
+                                      </p:to>
+                                    </p:set>
+                                  </p:childTnLst>
+                                </p:cTn>
+                              </p:par>
+                            </p:childTnLst>
+                          </p:cTn>
+                        </p:par>
+                      </p:childTnLst>
+                    </p:cTn>
+                  </p:par>
+                  <p:par>
+                    <p:cTn id="10" fill="hold">
+                      <p:stCondLst>
+                        <p:cond delay="indefinite"/>
+                      </p:stCondLst>
+                      <p:childTnLst>
+                        <p:par>
+                          <p:cTn id="11" fill="hold">
+                            <p:stCondLst>
+                              <p:cond delay="0"/>
+                            </p:stCondLst>
+                            <p:childTnLst>
+                              <p:par>
+                                <p:cTn id="12" presetID="10" presetClass="entr" presetSubtype="0" fill="hold" nodeType="clickEffect">
+                                  <p:stCondLst>
+                                    <p:cond delay="0"/>
+                                  </p:stCondLst>
+                                  <p:childTnLst>
+                                    <p:set>
+                                      <p:cBhvr>
+                                        <p:cTn id="13" dur="1" fill="hold">
+                                          <p:stCondLst>
+                                            <p:cond delay="0"/>
+                                          </p:stCondLst>
+                                        </p:cTn>
+                                        <p:tgtEl>
+                                          <p:spTgt spid="17"/>
+                                        </p:tgtEl>
+                                        <p:attrNameLst>
+                                          <p:attrName>style.visibility</p:attrName>
+                                        </p:attrNameLst>
+                                      </p:cBhvr>
+                                      <p:to>
+                                        <p:strVal val="visible"/>
+                                      </p:to>
+                                    </p:set>
+                                    <p:animEffect transition="in" filter="fade">
+                                      <p:cBhvr>
+                                        <p:cTn id="14" dur="500"/>
+                                        <p:tgtEl>
+                                          <p:spTgt spid="17"/>
+                                        </p:tgtEl>
+                                      </p:cBhvr>
+                                    </p:animEffect>
+                                  </p:childTnLst>
+                                </p:cTn>
+                              </p:par>
+                            </p:childTnLst>
+                          </p:cTn>
+                        </p:par>
+                      </p:childTnLst>
+                    </p:cTn>
+                  </p:par>
+                  <p:par>
+                    <p:cTn id="15" fill="hold">
+                      <p:stCondLst>
+                        <p:cond delay="indefinite"/>
+                      </p:stCondLst>
+                      <p:childTnLst>
+                        <p:par>
+                          <p:cTn id="16" fill="hold">
+                            <p:stCondLst>
+                              <p:cond delay="0"/>
+                            </p:stCondLst>
+                            <p:childTnLst>
+                              <p:par>
+                                <p:cTn id="17" presetID="1" presetClass="entr" presetSubtype="0" fill="hold" grpId="0" nodeType="clickEffect">
+                                  <p:stCondLst>
+                                    <p:cond delay="0"/>
+                                  </p:stCondLst>
+                                  <p:childTnLst>
+                                    <p:set>
+                                      <p:cBhvr>
+                                        <p:cTn id="18" dur="1" fill="hold">
+                                          <p:stCondLst>
+                                            <p:cond delay="0"/>
+                                          </p:stCondLst>
+                                        </p:cTn>
+                                        <p:tgtEl>
+                                          <p:spTgt spid="22"/>
+                                        </p:tgtEl>
+                                        <p:attrNameLst>
+                                          <p:attrName>style.visibility</p:attrName>
+                                        </p:attrNameLst>
+                                      </p:cBhvr>
+                                      <p:to>
+                                        <p:strVal val="visible"/>
+                                      </p:to>
+                                    </p:set>
+                                  </p:childTnLst>
+                                </p:cTn>
+                              </p:par>
+                            </p:childTnLst>
+                          </p:cTn>
+                        </p:par>
+                      </p:childTnLst>
+                    </p:cTn>
+                  </p:par>
+                  <p:par>
+                    <p:cTn id="19" fill="hold">
+                      <p:stCondLst>
+                        <p:cond delay="indefinite"/>
+                      </p:stCondLst>
+                      <p:childTnLst>
+                        <p:par>
+                          <p:cTn id="20" fill="hold">
+                            <p:stCondLst>
+                              <p:cond delay="0"/>
+                            </p:stCondLst>
+                            <p:childTnLst>
+                              <p:par>
+                                <p:cTn id="21" presetID="10" presetClass="entr" presetSubtype="0" fill="hold" nodeType="clickEffect">
+                                  <p:stCondLst>
+                                    <p:cond delay="0"/>
+                                  </p:stCondLst>
+                                  <p:childTnLst>
+                                    <p:set>
+                                      <p:cBhvr>
+                                        <p:cTn id="22" dur="1" fill="hold">
+                                          <p:stCondLst>
+                                            <p:cond delay="0"/>
+                                          </p:stCondLst>
+                                        </p:cTn>
+                                        <p:tgtEl>
+                                          <p:spTgt spid="21"/>
+                                        </p:tgtEl>
+                                        <p:attrNameLst>
+                                          <p:attrName>style.visibility</p:attrName>
+                                        </p:attrNameLst>
+                                      </p:cBhvr>
+                                      <p:to>
+                                        <p:strVal val="visible"/>
+                                      </p:to>
+                                    </p:set>
+                                    <p:animEffect transition="in" filter="fade">
+                                      <p:cBhvr>
+                                        <p:cTn id="23" dur="500"/>
+                                        <p:tgtEl>
+                                          <p:spTgt spid="21"/>
+                                        </p:tgtEl>
+                                      </p:cBhvr>
+                                    </p:animEffect>
+                                  </p:childTnLst>
+                                </p:cTn>
+                              </p:par>
+                            </p:childTnLst>
+                          </p:cTn>
+                        </p:par>
+                      </p:childTnLst>
+                    </p:cTn>
+                  </p:par>
+                </p:childTnLst>
+              </p:cTn>
+              <p:prevCondLst>
+                <p:cond evt="onPrev" delay="0">
+                  <p:tgtEl>
+                    <p:sldTgt/>
+                  </p:tgtEl>
+                </p:cond>
+              </p:prevCondLst>
+              <p:nextCondLst>
+                <p:cond evt="onNext" delay="0">
+                  <p:tgtEl>
+                    <p:sldTgt/>
+                  </p:tgtEl>
+                </p:cond>
+              </p:nextCondLst>
+            </p:seq>
+          </p:childTnLst>
+        </p:cTn>
+      </p:par>
+    </p:tnLst>
+    <p:bldLst>
+      <p:bldP spid="14" grpId="0" animBg="1"/>
+      <p:bldP spid="22" grpId="0" animBg="1"/>
+    </p:bldLst>
+  </p:timing>
+</p:sld>
+</file>
+
+<file path=ppt/slides/slide6.xml><?xml version="1.0" encoding="utf-8"?>
+<p:sld xmlns:a="http://schemas.openxmlformats.org/drawingml/2006/main" xmlns:r="http://schemas.openxmlformats.org/officeDocument/2006/relationships" xmlns:p="http://schemas.openxmlformats.org/presentationml/2006/main">
+  <p:cSld>
+    <p:spTree>
+      <p:nvGrpSpPr>
+        <p:cNvPr id="1" name=""/>
+        <p:cNvGrpSpPr/>
+        <p:nvPr/>
+      </p:nvGrpSpPr>
+      <p:grpSpPr>
+        <a:xfrm>
+          <a:off x="0" y="0"/>
+          <a:ext cx="0" cy="0"/>
+          <a:chOff x="0" y="0"/>
+          <a:chExt cx="0" cy="0"/>
+        </a:xfrm>
+      </p:grpSpPr>
+      <p:pic>
+        <p:nvPicPr>
+          <p:cNvPr id="19" name="Picture 18">
+            <a:extLst>
+              <a:ext uri="{FF2B5EF4-FFF2-40B4-BE49-F238E27FC236}">
+                <a16:creationId xmlns:a16="http://schemas.microsoft.com/office/drawing/2014/main" id="{9F33DB36-A31D-690E-00AA-50DA6CA5371B}"/>
+              </a:ext>
+            </a:extLst>
+          </p:cNvPr>
+          <p:cNvPicPr>
+            <a:picLocks noChangeAspect="1"/>
+          </p:cNvPicPr>
+          <p:nvPr/>
+        </p:nvPicPr>
+        <p:blipFill>
+          <a:blip r:embed="rId2"/>
+          <a:stretch>
+            <a:fillRect/>
+          </a:stretch>
+        </p:blipFill>
+        <p:spPr>
+          <a:xfrm>
+            <a:off x="7681113" y="1560825"/>
+            <a:ext cx="2556557" cy="5010264"/>
+          </a:xfrm>
+          <a:prstGeom prst="rect">
+            <a:avLst/>
+          </a:prstGeom>
+        </p:spPr>
+      </p:pic>
+      <p:pic>
+        <p:nvPicPr>
+          <p:cNvPr id="4" name="Picture 3">
+            <a:extLst>
+              <a:ext uri="{FF2B5EF4-FFF2-40B4-BE49-F238E27FC236}">
+                <a16:creationId xmlns:a16="http://schemas.microsoft.com/office/drawing/2014/main" id="{2813FBB8-9EE3-FB3D-AE13-32E3EA83E857}"/>
+              </a:ext>
+            </a:extLst>
+          </p:cNvPr>
+          <p:cNvPicPr>
+            <a:picLocks noChangeAspect="1"/>
+          </p:cNvPicPr>
+          <p:nvPr/>
+        </p:nvPicPr>
+        <p:blipFill>
+          <a:blip r:embed="rId3"/>
+          <a:stretch>
+            <a:fillRect/>
+          </a:stretch>
+        </p:blipFill>
+        <p:spPr>
+          <a:xfrm>
+            <a:off x="891157" y="1574846"/>
+            <a:ext cx="2666952" cy="5204737"/>
+          </a:xfrm>
+          <a:prstGeom prst="rect">
+            <a:avLst/>
+          </a:prstGeom>
+        </p:spPr>
+      </p:pic>
+      <p:pic>
+        <p:nvPicPr>
+          <p:cNvPr id="11" name="Picture 10">
+            <a:extLst>
+              <a:ext uri="{FF2B5EF4-FFF2-40B4-BE49-F238E27FC236}">
+                <a16:creationId xmlns:a16="http://schemas.microsoft.com/office/drawing/2014/main" id="{DE385C9C-2F45-CDE4-174E-6D66C225E4C6}"/>
+              </a:ext>
+            </a:extLst>
+          </p:cNvPr>
+          <p:cNvPicPr>
+            <a:picLocks noChangeAspect="1"/>
+          </p:cNvPicPr>
+          <p:nvPr/>
+        </p:nvPicPr>
+        <p:blipFill>
+          <a:blip r:embed="rId4"/>
+          <a:stretch>
+            <a:fillRect/>
+          </a:stretch>
+        </p:blipFill>
+        <p:spPr>
+          <a:xfrm>
+            <a:off x="4396364" y="1574846"/>
+            <a:ext cx="2666952" cy="5211986"/>
+          </a:xfrm>
+          <a:prstGeom prst="rect">
+            <a:avLst/>
+          </a:prstGeom>
+        </p:spPr>
+      </p:pic>
+      <p:pic>
+        <p:nvPicPr>
+          <p:cNvPr id="13" name="Picture 12">
+            <a:extLst>
+              <a:ext uri="{FF2B5EF4-FFF2-40B4-BE49-F238E27FC236}">
+                <a16:creationId xmlns:a16="http://schemas.microsoft.com/office/drawing/2014/main" id="{D85404EF-5C7C-A84F-00F9-CC945DC86E04}"/>
+              </a:ext>
+            </a:extLst>
+          </p:cNvPr>
+          <p:cNvPicPr>
+            <a:picLocks noChangeAspect="1"/>
+          </p:cNvPicPr>
+          <p:nvPr/>
+        </p:nvPicPr>
+        <p:blipFill>
+          <a:blip r:embed="rId5"/>
+          <a:stretch>
+            <a:fillRect/>
+          </a:stretch>
+        </p:blipFill>
+        <p:spPr>
+          <a:xfrm>
+            <a:off x="7681113" y="1560825"/>
+            <a:ext cx="2666953" cy="5204368"/>
+          </a:xfrm>
+          <a:prstGeom prst="rect">
+            <a:avLst/>
+          </a:prstGeom>
+        </p:spPr>
+      </p:pic>
+      <p:sp>
+        <p:nvSpPr>
+          <p:cNvPr id="14" name="Arrow: Right 13">
+            <a:extLst>
+              <a:ext uri="{FF2B5EF4-FFF2-40B4-BE49-F238E27FC236}">
+                <a16:creationId xmlns:a16="http://schemas.microsoft.com/office/drawing/2014/main" id="{AF1AA67C-E310-11AC-7B4A-9A5975D8E55E}"/>
+              </a:ext>
+            </a:extLst>
+          </p:cNvPr>
+          <p:cNvSpPr/>
+          <p:nvPr/>
+        </p:nvSpPr>
+        <p:spPr>
+          <a:xfrm rot="7861871">
+            <a:off x="3482285" y="5979092"/>
+            <a:ext cx="501868" cy="210207"/>
+          </a:xfrm>
+          <a:prstGeom prst="rightArrow">
+            <a:avLst/>
+          </a:prstGeom>
+          <a:solidFill>
+            <a:schemeClr val="tx1"/>
+          </a:solidFill>
+          <a:ln>
+            <a:solidFill>
+              <a:schemeClr val="tx1"/>
+            </a:solidFill>
+          </a:ln>
+        </p:spPr>
+        <p:style>
+          <a:lnRef idx="2">
+            <a:schemeClr val="accent1">
+              <a:shade val="50000"/>
+            </a:schemeClr>
+          </a:lnRef>
+          <a:fillRef idx="1">
+            <a:schemeClr val="accent1"/>
+          </a:fillRef>
+          <a:effectRef idx="0">
+            <a:schemeClr val="accent1"/>
+          </a:effectRef>
+          <a:fontRef idx="minor">
+            <a:schemeClr val="lt1"/>
+          </a:fontRef>
+        </p:style>
+        <p:txBody>
+          <a:bodyPr rtlCol="0" anchor="ctr"/>
+          <a:lstStyle/>
+          <a:p>
+            <a:pPr algn="ctr"/>
+            <a:endParaRPr lang="en-US" dirty="0"/>
+          </a:p>
+        </p:txBody>
+      </p:sp>
+      <p:sp>
+        <p:nvSpPr>
+          <p:cNvPr id="16" name="Arrow: Right 15">
+            <a:extLst>
+              <a:ext uri="{FF2B5EF4-FFF2-40B4-BE49-F238E27FC236}">
+                <a16:creationId xmlns:a16="http://schemas.microsoft.com/office/drawing/2014/main" id="{AE11A75B-F4B6-0045-6B34-593053EDE276}"/>
+              </a:ext>
+            </a:extLst>
+          </p:cNvPr>
+          <p:cNvSpPr/>
+          <p:nvPr/>
+        </p:nvSpPr>
+        <p:spPr>
+          <a:xfrm rot="7861871">
+            <a:off x="9986736" y="1455722"/>
+            <a:ext cx="501868" cy="210207"/>
+          </a:xfrm>
+          <a:prstGeom prst="rightArrow">
+            <a:avLst/>
+          </a:prstGeom>
+          <a:solidFill>
+            <a:schemeClr val="tx1"/>
+          </a:solidFill>
+          <a:ln>
+            <a:solidFill>
+              <a:schemeClr val="tx1"/>
+            </a:solidFill>
+          </a:ln>
+        </p:spPr>
+        <p:style>
+          <a:lnRef idx="2">
+            <a:schemeClr val="accent1">
+              <a:shade val="50000"/>
+            </a:schemeClr>
+          </a:lnRef>
+          <a:fillRef idx="1">
+            <a:schemeClr val="accent1"/>
+          </a:fillRef>
+          <a:effectRef idx="0">
+            <a:schemeClr val="accent1"/>
+          </a:effectRef>
+          <a:fontRef idx="minor">
+            <a:schemeClr val="lt1"/>
+          </a:fontRef>
+        </p:style>
+        <p:txBody>
+          <a:bodyPr rtlCol="0" anchor="ctr"/>
+          <a:lstStyle/>
+          <a:p>
+            <a:pPr algn="ctr"/>
+            <a:endParaRPr lang="en-US" dirty="0"/>
+          </a:p>
+        </p:txBody>
+      </p:sp>
+      <p:sp>
+        <p:nvSpPr>
+          <p:cNvPr id="17" name="TextBox 16">
+            <a:extLst>
+              <a:ext uri="{FF2B5EF4-FFF2-40B4-BE49-F238E27FC236}">
+                <a16:creationId xmlns:a16="http://schemas.microsoft.com/office/drawing/2014/main" id="{885524AE-1F33-0D8B-28C6-2B0BB97616AB}"/>
+              </a:ext>
+            </a:extLst>
+          </p:cNvPr>
+          <p:cNvSpPr txBox="1"/>
+          <p:nvPr/>
+        </p:nvSpPr>
+        <p:spPr>
+          <a:xfrm>
+            <a:off x="168164" y="198637"/>
+            <a:ext cx="6096000" cy="1077218"/>
+          </a:xfrm>
+          <a:prstGeom prst="rect">
+            <a:avLst/>
+          </a:prstGeom>
+          <a:noFill/>
+        </p:spPr>
+        <p:txBody>
+          <a:bodyPr wrap="square">
+            <a:spAutoFit/>
+          </a:bodyPr>
+          <a:lstStyle/>
+          <a:p>
+            <a:r>
+              <a:rPr lang="en-US" sz="3200" b="1" dirty="0">
+                <a:solidFill>
+                  <a:srgbClr val="FE5722"/>
+                </a:solidFill>
+                <a:latin typeface="-apple-system"/>
+              </a:rPr>
+              <a:t> Categories page :</a:t>
+            </a:r>
+            <a:br>
+              <a:rPr lang="en-US" sz="3200" b="1" dirty="0">
+                <a:solidFill>
+                  <a:srgbClr val="FE5722"/>
+                </a:solidFill>
+                <a:latin typeface="-apple-system"/>
+              </a:rPr>
+            </a:br>
+            <a:endParaRPr lang="en-US" sz="3200" b="1" dirty="0">
+              <a:solidFill>
+                <a:srgbClr val="FE5722"/>
+              </a:solidFill>
+              <a:latin typeface="-apple-system"/>
+            </a:endParaRPr>
+          </a:p>
+        </p:txBody>
+      </p:sp>
+    </p:spTree>
+    <p:extLst>
+      <p:ext uri="{BB962C8B-B14F-4D97-AF65-F5344CB8AC3E}">
+        <p14:creationId xmlns:p14="http://schemas.microsoft.com/office/powerpoint/2010/main" val="555266064"/>
+      </p:ext>
+    </p:extLst>
+  </p:cSld>
+  <p:clrMapOvr>
+    <a:masterClrMapping/>
+  </p:clrMapOvr>
+  <p:timing>
+    <p:tnLst>
+      <p:par>
+        <p:cTn id="1" dur="indefinite" restart="never" nodeType="tmRoot">
+          <p:childTnLst>
+            <p:seq concurrent="1" nextAc="seek">
+              <p:cTn id="2" dur="indefinite" nodeType="mainSeq">
+                <p:childTnLst>
+                  <p:par>
+                    <p:cTn id="3" fill="hold">
+                      <p:stCondLst>
+                        <p:cond delay="indefinite"/>
+                      </p:stCondLst>
+                      <p:childTnLst>
+                        <p:par>
+                          <p:cTn id="4" fill="hold">
+                            <p:stCondLst>
+                              <p:cond delay="0"/>
+                            </p:stCondLst>
+                            <p:childTnLst>
+                              <p:par>
+                                <p:cTn id="5" presetID="27" presetClass="emph" presetSubtype="0" fill="remove" grpId="0" nodeType="clickEffect">
+                                  <p:stCondLst>
+                                    <p:cond delay="0"/>
+                                  </p:stCondLst>
+                                  <p:childTnLst>
+                                    <p:animClr clrSpc="rgb" dir="cw">
+                                      <p:cBhvr override="childStyle">
+                                        <p:cTn id="6" dur="250" autoRev="1" fill="remove"/>
+                                        <p:tgtEl>
+                                          <p:spTgt spid="14"/>
+                                        </p:tgtEl>
+                                        <p:attrNameLst>
+                                          <p:attrName>style.color</p:attrName>
+                                        </p:attrNameLst>
+                                      </p:cBhvr>
+                                      <p:to>
+                                        <a:schemeClr val="bg1"/>
+                                      </p:to>
+                                    </p:animClr>
+                                    <p:animClr clrSpc="rgb" dir="cw">
+                                      <p:cBhvr>
+                                        <p:cTn id="7" dur="250" autoRev="1" fill="remove"/>
+                                        <p:tgtEl>
+                                          <p:spTgt spid="14"/>
+                                        </p:tgtEl>
+                                        <p:attrNameLst>
+                                          <p:attrName>fillcolor</p:attrName>
+                                        </p:attrNameLst>
+                                      </p:cBhvr>
+                                      <p:to>
+                                        <a:schemeClr val="bg1"/>
+                                      </p:to>
+                                    </p:animClr>
+                                    <p:set>
+                                      <p:cBhvr>
+                                        <p:cTn id="8" dur="250" autoRev="1" fill="remove"/>
+                                        <p:tgtEl>
+                                          <p:spTgt spid="14"/>
+                                        </p:tgtEl>
+                                        <p:attrNameLst>
+                                          <p:attrName>fill.type</p:attrName>
+                                        </p:attrNameLst>
+                                      </p:cBhvr>
+                                      <p:to>
+                                        <p:strVal val="solid"/>
+                                      </p:to>
+                                    </p:set>
+                                    <p:set>
+                                      <p:cBhvr>
+                                        <p:cTn id="9" dur="250" autoRev="1" fill="remove"/>
+                                        <p:tgtEl>
+                                          <p:spTgt spid="14"/>
+                                        </p:tgtEl>
+                                        <p:attrNameLst>
+                                          <p:attrName>fill.on</p:attrName>
+                                        </p:attrNameLst>
+                                      </p:cBhvr>
+                                      <p:to>
+                                        <p:strVal val="true"/>
+                                      </p:to>
+                                    </p:set>
+                                  </p:childTnLst>
+                                </p:cTn>
+                              </p:par>
+                            </p:childTnLst>
+                          </p:cTn>
+                        </p:par>
+                      </p:childTnLst>
+                    </p:cTn>
+                  </p:par>
+                  <p:par>
+                    <p:cTn id="10" fill="hold">
+                      <p:stCondLst>
+                        <p:cond delay="indefinite"/>
+                      </p:stCondLst>
+                      <p:childTnLst>
+                        <p:par>
+                          <p:cTn id="11" fill="hold">
+                            <p:stCondLst>
+                              <p:cond delay="0"/>
+                            </p:stCondLst>
+                            <p:childTnLst>
+                              <p:par>
+                                <p:cTn id="12" presetID="1" presetClass="entr" presetSubtype="0" fill="hold" nodeType="clickEffect">
+                                  <p:stCondLst>
+                                    <p:cond delay="0"/>
+                                  </p:stCondLst>
+                                  <p:childTnLst>
+                                    <p:set>
+                                      <p:cBhvr>
+                                        <p:cTn id="13" dur="1" fill="hold">
+                                          <p:stCondLst>
+                                            <p:cond delay="0"/>
+                                          </p:stCondLst>
+                                        </p:cTn>
+                                        <p:tgtEl>
+                                          <p:spTgt spid="11"/>
+                                        </p:tgtEl>
+                                        <p:attrNameLst>
+                                          <p:attrName>style.visibility</p:attrName>
+                                        </p:attrNameLst>
+                                      </p:cBhvr>
+                                      <p:to>
+                                        <p:strVal val="visible"/>
+                                      </p:to>
+                                    </p:set>
+                                  </p:childTnLst>
+                                </p:cTn>
+                              </p:par>
+                            </p:childTnLst>
+                          </p:cTn>
+                        </p:par>
+                      </p:childTnLst>
+                    </p:cTn>
+                  </p:par>
+                  <p:par>
+                    <p:cTn id="14" fill="hold">
+                      <p:stCondLst>
+                        <p:cond delay="indefinite"/>
+                      </p:stCondLst>
+                      <p:childTnLst>
+                        <p:par>
+                          <p:cTn id="15" fill="hold">
+                            <p:stCondLst>
+                              <p:cond delay="0"/>
+                            </p:stCondLst>
+                            <p:childTnLst>
+                              <p:par>
+                                <p:cTn id="16" presetID="1" presetClass="entr" presetSubtype="0" fill="hold" nodeType="clickEffect">
+                                  <p:stCondLst>
+                                    <p:cond delay="0"/>
+                                  </p:stCondLst>
+                                  <p:childTnLst>
+                                    <p:set>
+                                      <p:cBhvr>
+                                        <p:cTn id="17" dur="1" fill="hold">
+                                          <p:stCondLst>
+                                            <p:cond delay="0"/>
+                                          </p:stCondLst>
+                                        </p:cTn>
+                                        <p:tgtEl>
+                                          <p:spTgt spid="19"/>
+                                        </p:tgtEl>
+                                        <p:attrNameLst>
+                                          <p:attrName>style.visibility</p:attrName>
+                                        </p:attrNameLst>
+                                      </p:cBhvr>
+                                      <p:to>
+                                        <p:strVal val="visible"/>
+                                      </p:to>
+                                    </p:set>
+                                  </p:childTnLst>
+                                </p:cTn>
+                              </p:par>
+                            </p:childTnLst>
+                          </p:cTn>
+                        </p:par>
+                      </p:childTnLst>
+                    </p:cTn>
+                  </p:par>
+                  <p:par>
+                    <p:cTn id="18" fill="hold">
+                      <p:stCondLst>
+                        <p:cond delay="indefinite"/>
+                      </p:stCondLst>
+                      <p:childTnLst>
+                        <p:par>
+                          <p:cTn id="19" fill="hold">
+                            <p:stCondLst>
+                              <p:cond delay="0"/>
+                            </p:stCondLst>
+                            <p:childTnLst>
+                              <p:par>
+                                <p:cTn id="20" presetID="1" presetClass="entr" presetSubtype="0" fill="hold" grpId="0" nodeType="clickEffect">
+                                  <p:stCondLst>
+                                    <p:cond delay="0"/>
+                                  </p:stCondLst>
+                                  <p:childTnLst>
+                                    <p:set>
+                                      <p:cBhvr>
+                                        <p:cTn id="21" dur="1" fill="hold">
+                                          <p:stCondLst>
+                                            <p:cond delay="0"/>
+                                          </p:stCondLst>
+                                        </p:cTn>
+                                        <p:tgtEl>
+                                          <p:spTgt spid="16"/>
+                                        </p:tgtEl>
+                                        <p:attrNameLst>
+                                          <p:attrName>style.visibility</p:attrName>
+                                        </p:attrNameLst>
+                                      </p:cBhvr>
+                                      <p:to>
+                                        <p:strVal val="visible"/>
+                                      </p:to>
+                                    </p:set>
+                                  </p:childTnLst>
+                                </p:cTn>
+                              </p:par>
+                            </p:childTnLst>
+                          </p:cTn>
+                        </p:par>
+                      </p:childTnLst>
+                    </p:cTn>
+                  </p:par>
+                  <p:par>
+                    <p:cTn id="22" fill="hold">
+                      <p:stCondLst>
+                        <p:cond delay="indefinite"/>
+                      </p:stCondLst>
+                      <p:childTnLst>
+                        <p:par>
+                          <p:cTn id="23" fill="hold">
+                            <p:stCondLst>
+                              <p:cond delay="0"/>
+                            </p:stCondLst>
+                            <p:childTnLst>
+                              <p:par>
+                                <p:cTn id="24" presetID="10" presetClass="entr" presetSubtype="0" fill="hold" nodeType="clickEffect">
+                                  <p:stCondLst>
+                                    <p:cond delay="0"/>
+                                  </p:stCondLst>
+                                  <p:childTnLst>
+                                    <p:set>
+                                      <p:cBhvr>
+                                        <p:cTn id="25" dur="1" fill="hold">
+                                          <p:stCondLst>
+                                            <p:cond delay="0"/>
+                                          </p:stCondLst>
+                                        </p:cTn>
+                                        <p:tgtEl>
+                                          <p:spTgt spid="13"/>
+                                        </p:tgtEl>
+                                        <p:attrNameLst>
+                                          <p:attrName>style.visibility</p:attrName>
+                                        </p:attrNameLst>
+                                      </p:cBhvr>
+                                      <p:to>
+                                        <p:strVal val="visible"/>
+                                      </p:to>
+                                    </p:set>
+                                    <p:animEffect transition="in" filter="fade">
+                                      <p:cBhvr>
+                                        <p:cTn id="26" dur="500"/>
+                                        <p:tgtEl>
+                                          <p:spTgt spid="13"/>
+                                        </p:tgtEl>
+                                      </p:cBhvr>
+                                    </p:animEffect>
+                                  </p:childTnLst>
+                                </p:cTn>
+                              </p:par>
+                            </p:childTnLst>
+                          </p:cTn>
+                        </p:par>
+                      </p:childTnLst>
+                    </p:cTn>
+                  </p:par>
+                </p:childTnLst>
+              </p:cTn>
+              <p:prevCondLst>
+                <p:cond evt="onPrev" delay="0">
+                  <p:tgtEl>
+                    <p:sldTgt/>
+                  </p:tgtEl>
+                </p:cond>
+              </p:prevCondLst>
+              <p:nextCondLst>
+                <p:cond evt="onNext" delay="0">
+                  <p:tgtEl>
+                    <p:sldTgt/>
+                  </p:tgtEl>
+                </p:cond>
+              </p:nextCondLst>
+            </p:seq>
+          </p:childTnLst>
+        </p:cTn>
+      </p:par>
+    </p:tnLst>
+    <p:bldLst>
+      <p:bldP spid="14" grpId="0" animBg="1"/>
+      <p:bldP spid="16" grpId="0" animBg="1"/>
+    </p:bldLst>
+  </p:timing>
+</p:sld>
+</file>
+
+<file path=ppt/slides/slide7.xml><?xml version="1.0" encoding="utf-8"?>
+<p:sld xmlns:a="http://schemas.openxmlformats.org/drawingml/2006/main" xmlns:r="http://schemas.openxmlformats.org/officeDocument/2006/relationships" xmlns:p="http://schemas.openxmlformats.org/presentationml/2006/main">
+  <p:cSld>
+    <p:spTree>
+      <p:nvGrpSpPr>
+        <p:cNvPr id="1" name=""/>
+        <p:cNvGrpSpPr/>
+        <p:nvPr/>
+      </p:nvGrpSpPr>
+      <p:grpSpPr>
+        <a:xfrm>
+          <a:off x="0" y="0"/>
+          <a:ext cx="0" cy="0"/>
+          <a:chOff x="0" y="0"/>
+          <a:chExt cx="0" cy="0"/>
+        </a:xfrm>
+      </p:grpSpPr>
+      <p:pic>
+        <p:nvPicPr>
+          <p:cNvPr id="5" name="Picture 4">
+            <a:extLst>
+              <a:ext uri="{FF2B5EF4-FFF2-40B4-BE49-F238E27FC236}">
+                <a16:creationId xmlns:a16="http://schemas.microsoft.com/office/drawing/2014/main" id="{305353E9-6502-6359-AA4A-25D8BBA50893}"/>
+              </a:ext>
+            </a:extLst>
+          </p:cNvPr>
+          <p:cNvPicPr>
+            <a:picLocks noChangeAspect="1"/>
+          </p:cNvPicPr>
+          <p:nvPr/>
+        </p:nvPicPr>
+        <p:blipFill>
+          <a:blip r:embed="rId2"/>
+          <a:stretch>
+            <a:fillRect/>
+          </a:stretch>
+        </p:blipFill>
+        <p:spPr>
+          <a:xfrm>
+            <a:off x="6658426" y="1785389"/>
+            <a:ext cx="2599250" cy="5072611"/>
+          </a:xfrm>
+          <a:prstGeom prst="rect">
+            <a:avLst/>
+          </a:prstGeom>
+        </p:spPr>
+      </p:pic>
+      <p:pic>
+        <p:nvPicPr>
+          <p:cNvPr id="6" name="Picture 5">
+            <a:extLst>
+              <a:ext uri="{FF2B5EF4-FFF2-40B4-BE49-F238E27FC236}">
+                <a16:creationId xmlns:a16="http://schemas.microsoft.com/office/drawing/2014/main" id="{E3369CEC-07DD-DA29-A4F6-F013A61B4F18}"/>
+              </a:ext>
+            </a:extLst>
+          </p:cNvPr>
+          <p:cNvPicPr>
+            <a:picLocks noChangeAspect="1"/>
+          </p:cNvPicPr>
+          <p:nvPr/>
+        </p:nvPicPr>
+        <p:blipFill>
+          <a:blip r:embed="rId3"/>
+          <a:stretch>
+            <a:fillRect/>
+          </a:stretch>
+        </p:blipFill>
+        <p:spPr>
+          <a:xfrm>
+            <a:off x="2934324" y="1785388"/>
+            <a:ext cx="2618121" cy="5072611"/>
+          </a:xfrm>
+          <a:prstGeom prst="rect">
+            <a:avLst/>
+          </a:prstGeom>
+        </p:spPr>
+      </p:pic>
+      <p:pic>
+        <p:nvPicPr>
+          <p:cNvPr id="7" name="Picture 6">
+            <a:extLst>
+              <a:ext uri="{FF2B5EF4-FFF2-40B4-BE49-F238E27FC236}">
+                <a16:creationId xmlns:a16="http://schemas.microsoft.com/office/drawing/2014/main" id="{8202A7EA-A555-3F77-1AD7-DE2EDB28BE6D}"/>
+              </a:ext>
+            </a:extLst>
+          </p:cNvPr>
+          <p:cNvPicPr>
+            <a:picLocks noChangeAspect="1"/>
+          </p:cNvPicPr>
+          <p:nvPr/>
+        </p:nvPicPr>
+        <p:blipFill>
+          <a:blip r:embed="rId4"/>
+          <a:stretch>
+            <a:fillRect/>
+          </a:stretch>
+        </p:blipFill>
+        <p:spPr>
+          <a:xfrm>
+            <a:off x="6668541" y="1668089"/>
+            <a:ext cx="2711157" cy="5072612"/>
+          </a:xfrm>
+          <a:prstGeom prst="rect">
+            <a:avLst/>
+          </a:prstGeom>
+        </p:spPr>
+      </p:pic>
+      <p:sp>
+        <p:nvSpPr>
+          <p:cNvPr id="8" name="Arrow: Right 7">
+            <a:extLst>
+              <a:ext uri="{FF2B5EF4-FFF2-40B4-BE49-F238E27FC236}">
+                <a16:creationId xmlns:a16="http://schemas.microsoft.com/office/drawing/2014/main" id="{F4D9D2C6-2274-D718-A51D-E56E7F9EF1F1}"/>
+              </a:ext>
+            </a:extLst>
+          </p:cNvPr>
+          <p:cNvSpPr/>
+          <p:nvPr/>
+        </p:nvSpPr>
+        <p:spPr>
+          <a:xfrm rot="8025490">
+            <a:off x="5326659" y="1819232"/>
+            <a:ext cx="501868" cy="195200"/>
+          </a:xfrm>
+          <a:prstGeom prst="rightArrow">
+            <a:avLst/>
+          </a:prstGeom>
+          <a:solidFill>
+            <a:schemeClr val="tx1"/>
+          </a:solidFill>
+          <a:ln>
+            <a:solidFill>
+              <a:schemeClr val="tx1"/>
+            </a:solidFill>
+          </a:ln>
+        </p:spPr>
+        <p:style>
+          <a:lnRef idx="2">
+            <a:schemeClr val="accent1">
+              <a:shade val="50000"/>
+            </a:schemeClr>
+          </a:lnRef>
+          <a:fillRef idx="1">
+            <a:schemeClr val="accent1"/>
+          </a:fillRef>
+          <a:effectRef idx="0">
+            <a:schemeClr val="accent1"/>
+          </a:effectRef>
+          <a:fontRef idx="minor">
+            <a:schemeClr val="lt1"/>
+          </a:fontRef>
+        </p:style>
+        <p:txBody>
+          <a:bodyPr rtlCol="0" anchor="ctr"/>
+          <a:lstStyle/>
+          <a:p>
+            <a:pPr algn="ctr"/>
+            <a:endParaRPr lang="en-US"/>
+          </a:p>
+        </p:txBody>
+      </p:sp>
+      <p:sp>
+        <p:nvSpPr>
+          <p:cNvPr id="9" name="Arrow: Right 8">
+            <a:extLst>
+              <a:ext uri="{FF2B5EF4-FFF2-40B4-BE49-F238E27FC236}">
+                <a16:creationId xmlns:a16="http://schemas.microsoft.com/office/drawing/2014/main" id="{C24A18F5-FA33-3A04-01CD-E15C0B93356B}"/>
+              </a:ext>
+            </a:extLst>
+          </p:cNvPr>
+          <p:cNvSpPr/>
+          <p:nvPr/>
+        </p:nvSpPr>
+        <p:spPr>
+          <a:xfrm rot="8025490">
+            <a:off x="9006743" y="1819232"/>
+            <a:ext cx="501868" cy="195200"/>
+          </a:xfrm>
+          <a:prstGeom prst="rightArrow">
+            <a:avLst/>
+          </a:prstGeom>
+          <a:solidFill>
+            <a:schemeClr val="tx1"/>
+          </a:solidFill>
+          <a:ln>
+            <a:solidFill>
+              <a:schemeClr val="tx1"/>
+            </a:solidFill>
+          </a:ln>
+        </p:spPr>
+        <p:style>
+          <a:lnRef idx="2">
+            <a:schemeClr val="accent1">
+              <a:shade val="50000"/>
+            </a:schemeClr>
+          </a:lnRef>
+          <a:fillRef idx="1">
+            <a:schemeClr val="accent1"/>
+          </a:fillRef>
+          <a:effectRef idx="0">
+            <a:schemeClr val="accent1"/>
+          </a:effectRef>
+          <a:fontRef idx="minor">
+            <a:schemeClr val="lt1"/>
+          </a:fontRef>
+        </p:style>
+        <p:txBody>
+          <a:bodyPr rtlCol="0" anchor="ctr"/>
+          <a:lstStyle/>
+          <a:p>
+            <a:pPr algn="ctr"/>
+            <a:endParaRPr lang="en-US"/>
+          </a:p>
+        </p:txBody>
+      </p:sp>
+      <p:sp>
+        <p:nvSpPr>
+          <p:cNvPr id="10" name="TextBox 9">
+            <a:extLst>
+              <a:ext uri="{FF2B5EF4-FFF2-40B4-BE49-F238E27FC236}">
+                <a16:creationId xmlns:a16="http://schemas.microsoft.com/office/drawing/2014/main" id="{3120AD7E-F288-5CE4-7DF2-ABF2B90565E5}"/>
+              </a:ext>
+            </a:extLst>
+          </p:cNvPr>
+          <p:cNvSpPr txBox="1"/>
+          <p:nvPr/>
+        </p:nvSpPr>
+        <p:spPr>
+          <a:xfrm>
+            <a:off x="168164" y="198637"/>
+            <a:ext cx="6096000" cy="1077218"/>
+          </a:xfrm>
+          <a:prstGeom prst="rect">
+            <a:avLst/>
+          </a:prstGeom>
+          <a:noFill/>
+        </p:spPr>
+        <p:txBody>
+          <a:bodyPr wrap="square">
+            <a:spAutoFit/>
+          </a:bodyPr>
+          <a:lstStyle/>
+          <a:p>
+            <a:r>
+              <a:rPr lang="en-US" sz="3200" b="1" dirty="0">
+                <a:solidFill>
+                  <a:srgbClr val="FE5722"/>
+                </a:solidFill>
+                <a:latin typeface="-apple-system"/>
+              </a:rPr>
+              <a:t>Profile page &amp; sign out :</a:t>
+            </a:r>
+            <a:br>
+              <a:rPr lang="en-US" sz="3200" b="1" dirty="0">
+                <a:solidFill>
+                  <a:srgbClr val="FE5722"/>
+                </a:solidFill>
+                <a:latin typeface="-apple-system"/>
+              </a:rPr>
+            </a:br>
+            <a:endParaRPr lang="en-US" sz="3200" b="1" dirty="0">
+              <a:solidFill>
+                <a:srgbClr val="FE5722"/>
+              </a:solidFill>
+              <a:latin typeface="-apple-system"/>
+            </a:endParaRPr>
+          </a:p>
+        </p:txBody>
+      </p:sp>
+    </p:spTree>
+    <p:extLst>
+      <p:ext uri="{BB962C8B-B14F-4D97-AF65-F5344CB8AC3E}">
+        <p14:creationId xmlns:p14="http://schemas.microsoft.com/office/powerpoint/2010/main" val="3989077285"/>
+      </p:ext>
+    </p:extLst>
+  </p:cSld>
+  <p:clrMapOvr>
+    <a:masterClrMapping/>
+  </p:clrMapOvr>
+  <p:timing>
+    <p:tnLst>
+      <p:par>
+        <p:cTn id="1" dur="indefinite" restart="never" nodeType="tmRoot">
+          <p:childTnLst>
+            <p:seq concurrent="1" nextAc="seek">
+              <p:cTn id="2" dur="indefinite" nodeType="mainSeq">
+                <p:childTnLst>
+                  <p:par>
+                    <p:cTn id="3" fill="hold">
+                      <p:stCondLst>
+                        <p:cond delay="indefinite"/>
+                      </p:stCondLst>
+                      <p:childTnLst>
+                        <p:par>
+                          <p:cTn id="4" fill="hold">
+                            <p:stCondLst>
+                              <p:cond delay="0"/>
+                            </p:stCondLst>
+                            <p:childTnLst>
+                              <p:par>
+                                <p:cTn id="5" presetID="27" presetClass="emph" presetSubtype="0" fill="remove" grpId="0" nodeType="clickEffect">
+                                  <p:stCondLst>
+                                    <p:cond delay="0"/>
+                                  </p:stCondLst>
+                                  <p:childTnLst>
+                                    <p:animClr clrSpc="rgb" dir="cw">
+                                      <p:cBhvr override="childStyle">
+                                        <p:cTn id="6" dur="250" autoRev="1" fill="remove"/>
+                                        <p:tgtEl>
+                                          <p:spTgt spid="8"/>
+                                        </p:tgtEl>
+                                        <p:attrNameLst>
+                                          <p:attrName>style.color</p:attrName>
+                                        </p:attrNameLst>
+                                      </p:cBhvr>
+                                      <p:to>
+                                        <a:schemeClr val="bg1"/>
+                                      </p:to>
+                                    </p:animClr>
+                                    <p:animClr clrSpc="rgb" dir="cw">
+                                      <p:cBhvr>
+                                        <p:cTn id="7" dur="250" autoRev="1" fill="remove"/>
+                                        <p:tgtEl>
+                                          <p:spTgt spid="8"/>
+                                        </p:tgtEl>
+                                        <p:attrNameLst>
+                                          <p:attrName>fillcolor</p:attrName>
+                                        </p:attrNameLst>
+                                      </p:cBhvr>
+                                      <p:to>
+                                        <a:schemeClr val="bg1"/>
+                                      </p:to>
+                                    </p:animClr>
+                                    <p:set>
+                                      <p:cBhvr>
+                                        <p:cTn id="8" dur="250" autoRev="1" fill="remove"/>
+                                        <p:tgtEl>
+                                          <p:spTgt spid="8"/>
+                                        </p:tgtEl>
+                                        <p:attrNameLst>
+                                          <p:attrName>fill.type</p:attrName>
+                                        </p:attrNameLst>
+                                      </p:cBhvr>
+                                      <p:to>
+                                        <p:strVal val="solid"/>
+                                      </p:to>
+                                    </p:set>
+                                    <p:set>
+                                      <p:cBhvr>
+                                        <p:cTn id="9" dur="250" autoRev="1" fill="remove"/>
+                                        <p:tgtEl>
+                                          <p:spTgt spid="8"/>
+                                        </p:tgtEl>
+                                        <p:attrNameLst>
+                                          <p:attrName>fill.on</p:attrName>
+                                        </p:attrNameLst>
+                                      </p:cBhvr>
+                                      <p:to>
+                                        <p:strVal val="true"/>
+                                      </p:to>
+                                    </p:set>
+                                  </p:childTnLst>
+                                </p:cTn>
+                              </p:par>
+                            </p:childTnLst>
+                          </p:cTn>
+                        </p:par>
+                      </p:childTnLst>
+                    </p:cTn>
+                  </p:par>
+                  <p:par>
+                    <p:cTn id="10" fill="hold">
+                      <p:stCondLst>
+                        <p:cond delay="indefinite"/>
+                      </p:stCondLst>
+                      <p:childTnLst>
+                        <p:par>
+                          <p:cTn id="11" fill="hold">
+                            <p:stCondLst>
+                              <p:cond delay="0"/>
+                            </p:stCondLst>
+                            <p:childTnLst>
+                              <p:par>
+                                <p:cTn id="12" presetID="10" presetClass="entr" presetSubtype="0" fill="hold" nodeType="clickEffect">
+                                  <p:stCondLst>
+                                    <p:cond delay="0"/>
+                                  </p:stCondLst>
+                                  <p:childTnLst>
+                                    <p:set>
+                                      <p:cBhvr>
+                                        <p:cTn id="13" dur="1" fill="hold">
+                                          <p:stCondLst>
+                                            <p:cond delay="0"/>
+                                          </p:stCondLst>
+                                        </p:cTn>
+                                        <p:tgtEl>
+                                          <p:spTgt spid="5"/>
+                                        </p:tgtEl>
+                                        <p:attrNameLst>
+                                          <p:attrName>style.visibility</p:attrName>
+                                        </p:attrNameLst>
+                                      </p:cBhvr>
+                                      <p:to>
+                                        <p:strVal val="visible"/>
+                                      </p:to>
+                                    </p:set>
+                                    <p:animEffect transition="in" filter="fade">
+                                      <p:cBhvr>
+                                        <p:cTn id="14" dur="500"/>
+                                        <p:tgtEl>
+                                          <p:spTgt spid="5"/>
+                                        </p:tgtEl>
+                                      </p:cBhvr>
+                                    </p:animEffect>
+                                  </p:childTnLst>
+                                </p:cTn>
+                              </p:par>
+                            </p:childTnLst>
+                          </p:cTn>
+                        </p:par>
+                      </p:childTnLst>
+                    </p:cTn>
+                  </p:par>
+                  <p:par>
+                    <p:cTn id="15" fill="hold">
+                      <p:stCondLst>
+                        <p:cond delay="indefinite"/>
+                      </p:stCondLst>
+                      <p:childTnLst>
+                        <p:par>
+                          <p:cTn id="16" fill="hold">
+                            <p:stCondLst>
+                              <p:cond delay="0"/>
+                            </p:stCondLst>
+                            <p:childTnLst>
+                              <p:par>
+                                <p:cTn id="17" presetID="1" presetClass="entr" presetSubtype="0" fill="hold" grpId="0" nodeType="clickEffect">
+                                  <p:stCondLst>
+                                    <p:cond delay="0"/>
+                                  </p:stCondLst>
+                                  <p:childTnLst>
+                                    <p:set>
+                                      <p:cBhvr>
+                                        <p:cTn id="18" dur="1" fill="hold">
+                                          <p:stCondLst>
+                                            <p:cond delay="0"/>
+                                          </p:stCondLst>
+                                        </p:cTn>
+                                        <p:tgtEl>
+                                          <p:spTgt spid="9"/>
+                                        </p:tgtEl>
+                                        <p:attrNameLst>
+                                          <p:attrName>style.visibility</p:attrName>
+                                        </p:attrNameLst>
+                                      </p:cBhvr>
+                                      <p:to>
+                                        <p:strVal val="visible"/>
+                                      </p:to>
+                                    </p:set>
+                                  </p:childTnLst>
+                                </p:cTn>
+                              </p:par>
+                            </p:childTnLst>
+                          </p:cTn>
+                        </p:par>
+                      </p:childTnLst>
+                    </p:cTn>
+                  </p:par>
+                  <p:par>
+                    <p:cTn id="19" fill="hold">
+                      <p:stCondLst>
+                        <p:cond delay="indefinite"/>
+                      </p:stCondLst>
+                      <p:childTnLst>
+                        <p:par>
+                          <p:cTn id="20" fill="hold">
+                            <p:stCondLst>
+                              <p:cond delay="0"/>
+                            </p:stCondLst>
+                            <p:childTnLst>
+                              <p:par>
+                                <p:cTn id="21" presetID="10" presetClass="entr" presetSubtype="0" fill="hold" nodeType="clickEffect">
+                                  <p:stCondLst>
+                                    <p:cond delay="0"/>
+                                  </p:stCondLst>
+                                  <p:childTnLst>
+                                    <p:set>
+                                      <p:cBhvr>
+                                        <p:cTn id="22" dur="1" fill="hold">
+                                          <p:stCondLst>
+                                            <p:cond delay="0"/>
+                                          </p:stCondLst>
+                                        </p:cTn>
+                                        <p:tgtEl>
+                                          <p:spTgt spid="7"/>
+                                        </p:tgtEl>
+                                        <p:attrNameLst>
+                                          <p:attrName>style.visibility</p:attrName>
+                                        </p:attrNameLst>
+                                      </p:cBhvr>
+                                      <p:to>
+                                        <p:strVal val="visible"/>
+                                      </p:to>
+                                    </p:set>
+                                    <p:animEffect transition="in" filter="fade">
+                                      <p:cBhvr>
+                                        <p:cTn id="23" dur="500"/>
+                                        <p:tgtEl>
+                                          <p:spTgt spid="7"/>
+                                        </p:tgtEl>
+                                      </p:cBhvr>
+                                    </p:animEffect>
+                                  </p:childTnLst>
+                                </p:cTn>
+                              </p:par>
+                            </p:childTnLst>
+                          </p:cTn>
+                        </p:par>
+                      </p:childTnLst>
+                    </p:cTn>
+                  </p:par>
+                </p:childTnLst>
+              </p:cTn>
+              <p:prevCondLst>
+                <p:cond evt="onPrev" delay="0">
+                  <p:tgtEl>
+                    <p:sldTgt/>
+                  </p:tgtEl>
+                </p:cond>
+              </p:prevCondLst>
+              <p:nextCondLst>
+                <p:cond evt="onNext" delay="0">
+                  <p:tgtEl>
+                    <p:sldTgt/>
+                  </p:tgtEl>
+                </p:cond>
+              </p:nextCondLst>
+            </p:seq>
+          </p:childTnLst>
+        </p:cTn>
+      </p:par>
+    </p:tnLst>
+    <p:bldLst>
+      <p:bldP spid="8" grpId="0" animBg="1"/>
+      <p:bldP spid="9" grpId="0" animBg="1"/>
+    </p:bldLst>
+  </p:timing>
+</p:sld>
+</file>
+
+<file path=ppt/slides/slide8.xml><?xml version="1.0" encoding="utf-8"?>
+<p:sld xmlns:a="http://schemas.openxmlformats.org/drawingml/2006/main" xmlns:r="http://schemas.openxmlformats.org/officeDocument/2006/relationships" xmlns:p="http://schemas.openxmlformats.org/presentationml/2006/main">
+  <p:cSld>
+    <p:spTree>
+      <p:nvGrpSpPr>
+        <p:cNvPr id="1" name=""/>
+        <p:cNvGrpSpPr/>
+        <p:nvPr/>
+      </p:nvGrpSpPr>
+      <p:grpSpPr>
+        <a:xfrm>
+          <a:off x="0" y="0"/>
+          <a:ext cx="0" cy="0"/>
+          <a:chOff x="0" y="0"/>
+          <a:chExt cx="0" cy="0"/>
+        </a:xfrm>
+      </p:grpSpPr>
+      <p:pic>
+        <p:nvPicPr>
+          <p:cNvPr id="7" name="Content Placeholder 6">
+            <a:extLst>
+              <a:ext uri="{FF2B5EF4-FFF2-40B4-BE49-F238E27FC236}">
+                <a16:creationId xmlns:a16="http://schemas.microsoft.com/office/drawing/2014/main" id="{E99AC082-D51A-A59E-B266-D71B018BDA1E}"/>
+              </a:ext>
+            </a:extLst>
+          </p:cNvPr>
+          <p:cNvPicPr>
+            <a:picLocks noGrp="1" noChangeAspect="1"/>
+          </p:cNvPicPr>
+          <p:nvPr>
+            <p:ph idx="1"/>
+          </p:nvPr>
+        </p:nvPicPr>
+        <p:blipFill>
+          <a:blip r:embed="rId2"/>
+          <a:stretch>
+            <a:fillRect/>
+          </a:stretch>
+        </p:blipFill>
+        <p:spPr>
+          <a:xfrm>
+            <a:off x="2603705" y="1728374"/>
+            <a:ext cx="2438395" cy="4742502"/>
+          </a:xfrm>
+        </p:spPr>
+      </p:pic>
+      <p:pic>
+        <p:nvPicPr>
+          <p:cNvPr id="5" name="Picture 4">
+            <a:extLst>
+              <a:ext uri="{FF2B5EF4-FFF2-40B4-BE49-F238E27FC236}">
+                <a16:creationId xmlns:a16="http://schemas.microsoft.com/office/drawing/2014/main" id="{1BE907D3-2BBC-3ACA-65F3-B15E26D13470}"/>
+              </a:ext>
+            </a:extLst>
+          </p:cNvPr>
+          <p:cNvPicPr>
+            <a:picLocks noChangeAspect="1"/>
+          </p:cNvPicPr>
+          <p:nvPr/>
+        </p:nvPicPr>
+        <p:blipFill>
+          <a:blip r:embed="rId3"/>
+          <a:stretch>
+            <a:fillRect/>
+          </a:stretch>
+        </p:blipFill>
+        <p:spPr>
+          <a:xfrm>
+            <a:off x="5991741" y="1727987"/>
+            <a:ext cx="2438395" cy="4742889"/>
+          </a:xfrm>
+          <a:prstGeom prst="rect">
+            <a:avLst/>
+          </a:prstGeom>
+        </p:spPr>
+      </p:pic>
+      <p:pic>
+        <p:nvPicPr>
+          <p:cNvPr id="9" name="Picture 8">
+            <a:extLst>
+              <a:ext uri="{FF2B5EF4-FFF2-40B4-BE49-F238E27FC236}">
+                <a16:creationId xmlns:a16="http://schemas.microsoft.com/office/drawing/2014/main" id="{A145C401-27A1-97E1-BDB5-EDC974C496EF}"/>
+              </a:ext>
+            </a:extLst>
+          </p:cNvPr>
+          <p:cNvPicPr>
+            <a:picLocks noChangeAspect="1"/>
+          </p:cNvPicPr>
+          <p:nvPr/>
+        </p:nvPicPr>
+        <p:blipFill>
+          <a:blip r:embed="rId4"/>
+          <a:stretch>
+            <a:fillRect/>
+          </a:stretch>
+        </p:blipFill>
+        <p:spPr>
+          <a:xfrm>
+            <a:off x="6006394" y="1727986"/>
+            <a:ext cx="2473936" cy="4742889"/>
+          </a:xfrm>
+          <a:prstGeom prst="rect">
+            <a:avLst/>
+          </a:prstGeom>
+        </p:spPr>
+      </p:pic>
+      <p:pic>
+        <p:nvPicPr>
+          <p:cNvPr id="11" name="Picture 10">
+            <a:extLst>
+              <a:ext uri="{FF2B5EF4-FFF2-40B4-BE49-F238E27FC236}">
+                <a16:creationId xmlns:a16="http://schemas.microsoft.com/office/drawing/2014/main" id="{F5DDC021-2C16-9DD5-B92E-0CBA63CC3F51}"/>
+              </a:ext>
+            </a:extLst>
+          </p:cNvPr>
+          <p:cNvPicPr>
+            <a:picLocks noChangeAspect="1"/>
+          </p:cNvPicPr>
+          <p:nvPr/>
+        </p:nvPicPr>
+        <p:blipFill>
+          <a:blip r:embed="rId5"/>
+          <a:stretch>
+            <a:fillRect/>
+          </a:stretch>
+        </p:blipFill>
+        <p:spPr>
+          <a:xfrm>
+            <a:off x="8940974" y="1727985"/>
+            <a:ext cx="2438395" cy="4742889"/>
+          </a:xfrm>
+          <a:prstGeom prst="rect">
+            <a:avLst/>
+          </a:prstGeom>
+        </p:spPr>
+      </p:pic>
+      <p:pic>
+        <p:nvPicPr>
+          <p:cNvPr id="13" name="Picture 12">
+            <a:extLst>
+              <a:ext uri="{FF2B5EF4-FFF2-40B4-BE49-F238E27FC236}">
+                <a16:creationId xmlns:a16="http://schemas.microsoft.com/office/drawing/2014/main" id="{88015A48-FD2F-4471-EF16-9737B25ED5C0}"/>
+              </a:ext>
+            </a:extLst>
+          </p:cNvPr>
+          <p:cNvPicPr>
+            <a:picLocks noChangeAspect="1"/>
+          </p:cNvPicPr>
+          <p:nvPr/>
+        </p:nvPicPr>
+        <p:blipFill>
+          <a:blip r:embed="rId6"/>
+          <a:stretch>
+            <a:fillRect/>
+          </a:stretch>
+        </p:blipFill>
+        <p:spPr>
+          <a:xfrm>
+            <a:off x="8940973" y="1727985"/>
+            <a:ext cx="2438395" cy="4680415"/>
+          </a:xfrm>
+          <a:prstGeom prst="rect">
+            <a:avLst/>
+          </a:prstGeom>
+        </p:spPr>
+      </p:pic>
+      <p:sp>
+        <p:nvSpPr>
+          <p:cNvPr id="14" name="Arrow: Right 13">
+            <a:extLst>
+              <a:ext uri="{FF2B5EF4-FFF2-40B4-BE49-F238E27FC236}">
+                <a16:creationId xmlns:a16="http://schemas.microsoft.com/office/drawing/2014/main" id="{F967F065-5EFF-C7CD-9433-CBEAD4AEBBA6}"/>
+              </a:ext>
+            </a:extLst>
+          </p:cNvPr>
+          <p:cNvSpPr/>
+          <p:nvPr/>
+        </p:nvSpPr>
+        <p:spPr>
+          <a:xfrm rot="7861871">
+            <a:off x="4811942" y="1623270"/>
+            <a:ext cx="501868" cy="210207"/>
+          </a:xfrm>
+          <a:prstGeom prst="rightArrow">
+            <a:avLst/>
+          </a:prstGeom>
+          <a:solidFill>
+            <a:schemeClr val="tx1"/>
+          </a:solidFill>
+          <a:ln>
+            <a:solidFill>
+              <a:schemeClr val="tx1"/>
+            </a:solidFill>
+          </a:ln>
+        </p:spPr>
+        <p:style>
+          <a:lnRef idx="2">
+            <a:schemeClr val="accent1">
+              <a:shade val="50000"/>
+            </a:schemeClr>
+          </a:lnRef>
+          <a:fillRef idx="1">
+            <a:schemeClr val="accent1"/>
+          </a:fillRef>
+          <a:effectRef idx="0">
+            <a:schemeClr val="accent1"/>
+          </a:effectRef>
+          <a:fontRef idx="minor">
+            <a:schemeClr val="lt1"/>
+          </a:fontRef>
+        </p:style>
+        <p:txBody>
+          <a:bodyPr rtlCol="0" anchor="ctr"/>
+          <a:lstStyle/>
+          <a:p>
+            <a:pPr algn="ctr"/>
+            <a:endParaRPr lang="en-US" dirty="0"/>
+          </a:p>
+        </p:txBody>
+      </p:sp>
+      <p:sp>
+        <p:nvSpPr>
+          <p:cNvPr id="15" name="Arrow: Right 14">
+            <a:extLst>
+              <a:ext uri="{FF2B5EF4-FFF2-40B4-BE49-F238E27FC236}">
+                <a16:creationId xmlns:a16="http://schemas.microsoft.com/office/drawing/2014/main" id="{D92106EE-509A-E355-D566-04710B41E376}"/>
+              </a:ext>
+            </a:extLst>
+          </p:cNvPr>
+          <p:cNvSpPr/>
+          <p:nvPr/>
+        </p:nvSpPr>
+        <p:spPr>
+          <a:xfrm rot="7861871">
+            <a:off x="4378424" y="1623271"/>
+            <a:ext cx="501868" cy="210207"/>
+          </a:xfrm>
+          <a:prstGeom prst="rightArrow">
+            <a:avLst/>
+          </a:prstGeom>
+          <a:solidFill>
+            <a:schemeClr val="tx1"/>
+          </a:solidFill>
+          <a:ln>
+            <a:solidFill>
+              <a:schemeClr val="tx1"/>
+            </a:solidFill>
+          </a:ln>
+        </p:spPr>
+        <p:style>
+          <a:lnRef idx="2">
+            <a:schemeClr val="accent1">
+              <a:shade val="50000"/>
+            </a:schemeClr>
+          </a:lnRef>
+          <a:fillRef idx="1">
+            <a:schemeClr val="accent1"/>
+          </a:fillRef>
+          <a:effectRef idx="0">
+            <a:schemeClr val="accent1"/>
+          </a:effectRef>
+          <a:fontRef idx="minor">
+            <a:schemeClr val="lt1"/>
+          </a:fontRef>
+        </p:style>
+        <p:txBody>
+          <a:bodyPr rtlCol="0" anchor="ctr"/>
+          <a:lstStyle/>
+          <a:p>
+            <a:pPr algn="ctr"/>
+            <a:endParaRPr lang="en-US" dirty="0"/>
+          </a:p>
+        </p:txBody>
+      </p:sp>
+      <p:sp>
+        <p:nvSpPr>
+          <p:cNvPr id="16" name="Arrow: Right 15">
+            <a:extLst>
+              <a:ext uri="{FF2B5EF4-FFF2-40B4-BE49-F238E27FC236}">
+                <a16:creationId xmlns:a16="http://schemas.microsoft.com/office/drawing/2014/main" id="{85D2D209-653D-C58F-7932-50D61C3FA1F6}"/>
+              </a:ext>
+            </a:extLst>
+          </p:cNvPr>
+          <p:cNvSpPr/>
+          <p:nvPr/>
+        </p:nvSpPr>
+        <p:spPr>
+          <a:xfrm rot="10800000">
+            <a:off x="7999239" y="3572939"/>
+            <a:ext cx="501868" cy="210207"/>
+          </a:xfrm>
+          <a:prstGeom prst="rightArrow">
+            <a:avLst/>
+          </a:prstGeom>
+          <a:solidFill>
+            <a:schemeClr val="tx1"/>
+          </a:solidFill>
+          <a:ln>
+            <a:solidFill>
+              <a:schemeClr val="tx1"/>
+            </a:solidFill>
+          </a:ln>
+        </p:spPr>
+        <p:style>
+          <a:lnRef idx="2">
+            <a:schemeClr val="accent1">
+              <a:shade val="50000"/>
+            </a:schemeClr>
+          </a:lnRef>
+          <a:fillRef idx="1">
+            <a:schemeClr val="accent1"/>
+          </a:fillRef>
+          <a:effectRef idx="0">
+            <a:schemeClr val="accent1"/>
+          </a:effectRef>
+          <a:fontRef idx="minor">
+            <a:schemeClr val="lt1"/>
+          </a:fontRef>
+        </p:style>
+        <p:txBody>
+          <a:bodyPr rtlCol="0" anchor="ctr"/>
+          <a:lstStyle/>
+          <a:p>
+            <a:pPr algn="ctr"/>
+            <a:endParaRPr lang="en-US" dirty="0"/>
+          </a:p>
+        </p:txBody>
+      </p:sp>
+      <p:sp>
+        <p:nvSpPr>
+          <p:cNvPr id="17" name="Arrow: Right 16">
+            <a:extLst>
+              <a:ext uri="{FF2B5EF4-FFF2-40B4-BE49-F238E27FC236}">
+                <a16:creationId xmlns:a16="http://schemas.microsoft.com/office/drawing/2014/main" id="{2EC93EF4-C594-9073-55EA-314FD5FF67EA}"/>
+              </a:ext>
+            </a:extLst>
+          </p:cNvPr>
+          <p:cNvSpPr/>
+          <p:nvPr/>
+        </p:nvSpPr>
+        <p:spPr>
+          <a:xfrm rot="7861871">
+            <a:off x="10671461" y="3757265"/>
+            <a:ext cx="501868" cy="210207"/>
+          </a:xfrm>
+          <a:prstGeom prst="rightArrow">
+            <a:avLst/>
+          </a:prstGeom>
+          <a:solidFill>
+            <a:schemeClr val="tx1"/>
+          </a:solidFill>
+          <a:ln>
+            <a:solidFill>
+              <a:schemeClr val="tx1"/>
+            </a:solidFill>
+          </a:ln>
+        </p:spPr>
+        <p:style>
+          <a:lnRef idx="2">
+            <a:schemeClr val="accent1">
+              <a:shade val="50000"/>
+            </a:schemeClr>
+          </a:lnRef>
+          <a:fillRef idx="1">
+            <a:schemeClr val="accent1"/>
+          </a:fillRef>
+          <a:effectRef idx="0">
+            <a:schemeClr val="accent1"/>
+          </a:effectRef>
+          <a:fontRef idx="minor">
+            <a:schemeClr val="lt1"/>
+          </a:fontRef>
+        </p:style>
+        <p:txBody>
+          <a:bodyPr rtlCol="0" anchor="ctr"/>
+          <a:lstStyle/>
+          <a:p>
+            <a:pPr algn="ctr"/>
+            <a:endParaRPr lang="en-US" dirty="0"/>
+          </a:p>
+        </p:txBody>
+      </p:sp>
+      <p:sp>
+        <p:nvSpPr>
+          <p:cNvPr id="18" name="TextBox 17">
+            <a:extLst>
+              <a:ext uri="{FF2B5EF4-FFF2-40B4-BE49-F238E27FC236}">
+                <a16:creationId xmlns:a16="http://schemas.microsoft.com/office/drawing/2014/main" id="{3A7CFE96-3E65-0D4E-2C7C-7352B83CBFE6}"/>
+              </a:ext>
+            </a:extLst>
+          </p:cNvPr>
+          <p:cNvSpPr txBox="1"/>
+          <p:nvPr/>
+        </p:nvSpPr>
+        <p:spPr>
+          <a:xfrm>
+            <a:off x="168164" y="198637"/>
+            <a:ext cx="6096000" cy="1077218"/>
+          </a:xfrm>
+          <a:prstGeom prst="rect">
+            <a:avLst/>
+          </a:prstGeom>
+          <a:noFill/>
+        </p:spPr>
+        <p:txBody>
+          <a:bodyPr wrap="square">
+            <a:spAutoFit/>
+          </a:bodyPr>
+          <a:lstStyle/>
+          <a:p>
+            <a:r>
+              <a:rPr lang="en-US" sz="3200" b="1" dirty="0">
+                <a:solidFill>
+                  <a:srgbClr val="FE5722"/>
+                </a:solidFill>
+                <a:latin typeface="-apple-system"/>
+              </a:rPr>
+              <a:t>Explore page :</a:t>
+            </a:r>
+            <a:br>
+              <a:rPr lang="en-US" sz="3200" b="1" dirty="0">
+                <a:solidFill>
+                  <a:srgbClr val="FE5722"/>
+                </a:solidFill>
+                <a:latin typeface="-apple-system"/>
+              </a:rPr>
+            </a:br>
+            <a:endParaRPr lang="en-US" sz="3200" b="1" dirty="0">
+              <a:solidFill>
+                <a:srgbClr val="FE5722"/>
+              </a:solidFill>
+              <a:latin typeface="-apple-system"/>
+            </a:endParaRPr>
+          </a:p>
+        </p:txBody>
+      </p:sp>
+    </p:spTree>
+    <p:extLst>
+      <p:ext uri="{BB962C8B-B14F-4D97-AF65-F5344CB8AC3E}">
+        <p14:creationId xmlns:p14="http://schemas.microsoft.com/office/powerpoint/2010/main" val="387294031"/>
+      </p:ext>
+    </p:extLst>
+  </p:cSld>
+  <p:clrMapOvr>
+    <a:masterClrMapping/>
+  </p:clrMapOvr>
+  <p:timing>
+    <p:tnLst>
+      <p:par>
+        <p:cTn id="1" dur="indefinite" restart="never" nodeType="tmRoot">
+          <p:childTnLst>
+            <p:seq concurrent="1" nextAc="seek">
+              <p:cTn id="2" dur="indefinite" nodeType="mainSeq">
+                <p:childTnLst>
+                  <p:par>
+                    <p:cTn id="3" fill="hold">
+                      <p:stCondLst>
+                        <p:cond delay="indefinite"/>
+                      </p:stCondLst>
+                      <p:childTnLst>
+                        <p:par>
+                          <p:cTn id="4" fill="hold">
+                            <p:stCondLst>
+                              <p:cond delay="0"/>
+                            </p:stCondLst>
+                            <p:childTnLst>
+                              <p:par>
+                                <p:cTn id="5" presetID="10" presetClass="entr" presetSubtype="0" fill="hold" grpId="0" nodeType="clickEffect">
+                                  <p:stCondLst>
+                                    <p:cond delay="0"/>
+                                  </p:stCondLst>
+                                  <p:childTnLst>
+                                    <p:set>
+                                      <p:cBhvr>
+                                        <p:cTn id="6" dur="1" fill="hold">
+                                          <p:stCondLst>
+                                            <p:cond delay="0"/>
+                                          </p:stCondLst>
+                                        </p:cTn>
+                                        <p:tgtEl>
+                                          <p:spTgt spid="14"/>
+                                        </p:tgtEl>
+                                        <p:attrNameLst>
+                                          <p:attrName>style.visibility</p:attrName>
+                                        </p:attrNameLst>
+                                      </p:cBhvr>
+                                      <p:to>
+                                        <p:strVal val="visible"/>
+                                      </p:to>
+                                    </p:set>
+                                    <p:animEffect transition="in" filter="fade">
+                                      <p:cBhvr>
+                                        <p:cTn id="7" dur="500"/>
+                                        <p:tgtEl>
+                                          <p:spTgt spid="14"/>
+                                        </p:tgtEl>
+                                      </p:cBhvr>
+                                    </p:animEffect>
+                                  </p:childTnLst>
+                                </p:cTn>
+                              </p:par>
+                            </p:childTnLst>
+                          </p:cTn>
+                        </p:par>
+                      </p:childTnLst>
+                    </p:cTn>
+                  </p:par>
+                  <p:par>
+                    <p:cTn id="8" fill="hold">
+                      <p:stCondLst>
+                        <p:cond delay="indefinite"/>
+                      </p:stCondLst>
+                      <p:childTnLst>
+                        <p:par>
+                          <p:cTn id="9" fill="hold">
+                            <p:stCondLst>
+                              <p:cond delay="0"/>
+                            </p:stCondLst>
+                            <p:childTnLst>
+                              <p:par>
+                                <p:cTn id="10" presetID="10" presetClass="entr" presetSubtype="0" fill="hold" nodeType="clickEffect">
+                                  <p:stCondLst>
+                                    <p:cond delay="0"/>
+                                  </p:stCondLst>
+                                  <p:childTnLst>
+                                    <p:set>
+                                      <p:cBhvr>
+                                        <p:cTn id="11" dur="1" fill="hold">
+                                          <p:stCondLst>
+                                            <p:cond delay="0"/>
+                                          </p:stCondLst>
+                                        </p:cTn>
+                                        <p:tgtEl>
+                                          <p:spTgt spid="5"/>
+                                        </p:tgtEl>
+                                        <p:attrNameLst>
+                                          <p:attrName>style.visibility</p:attrName>
+                                        </p:attrNameLst>
+                                      </p:cBhvr>
+                                      <p:to>
+                                        <p:strVal val="visible"/>
+                                      </p:to>
+                                    </p:set>
+                                    <p:animEffect transition="in" filter="fade">
+                                      <p:cBhvr>
+                                        <p:cTn id="12" dur="500"/>
+                                        <p:tgtEl>
+                                          <p:spTgt spid="5"/>
+                                        </p:tgtEl>
+                                      </p:cBhvr>
+                                    </p:animEffect>
+                                  </p:childTnLst>
+                                </p:cTn>
+                              </p:par>
+                            </p:childTnLst>
+                          </p:cTn>
+                        </p:par>
+                      </p:childTnLst>
+                    </p:cTn>
+                  </p:par>
+                  <p:par>
+                    <p:cTn id="13" fill="hold">
+                      <p:stCondLst>
+                        <p:cond delay="indefinite"/>
+                      </p:stCondLst>
+                      <p:childTnLst>
+                        <p:par>
+                          <p:cTn id="14" fill="hold">
+                            <p:stCondLst>
+                              <p:cond delay="0"/>
+                            </p:stCondLst>
+                            <p:childTnLst>
+                              <p:par>
+                                <p:cTn id="15" presetID="1" presetClass="entr" presetSubtype="0" fill="hold" grpId="0" nodeType="clickEffect">
+                                  <p:stCondLst>
+                                    <p:cond delay="0"/>
+                                  </p:stCondLst>
+                                  <p:childTnLst>
+                                    <p:set>
+                                      <p:cBhvr>
+                                        <p:cTn id="16" dur="1" fill="hold">
+                                          <p:stCondLst>
+                                            <p:cond delay="0"/>
+                                          </p:stCondLst>
+                                        </p:cTn>
+                                        <p:tgtEl>
+                                          <p:spTgt spid="15"/>
+                                        </p:tgtEl>
+                                        <p:attrNameLst>
+                                          <p:attrName>style.visibility</p:attrName>
+                                        </p:attrNameLst>
+                                      </p:cBhvr>
+                                      <p:to>
+                                        <p:strVal val="visible"/>
+                                      </p:to>
+                                    </p:set>
+                                  </p:childTnLst>
+                                </p:cTn>
+                              </p:par>
+                            </p:childTnLst>
+                          </p:cTn>
+                        </p:par>
+                      </p:childTnLst>
+                    </p:cTn>
+                  </p:par>
+                  <p:par>
+                    <p:cTn id="17" fill="hold">
+                      <p:stCondLst>
+                        <p:cond delay="indefinite"/>
+                      </p:stCondLst>
+                      <p:childTnLst>
+                        <p:par>
+                          <p:cTn id="18" fill="hold">
+                            <p:stCondLst>
+                              <p:cond delay="0"/>
+                            </p:stCondLst>
+                            <p:childTnLst>
+                              <p:par>
+                                <p:cTn id="19" presetID="10" presetClass="entr" presetSubtype="0" fill="hold" nodeType="clickEffect">
+                                  <p:stCondLst>
+                                    <p:cond delay="0"/>
+                                  </p:stCondLst>
+                                  <p:childTnLst>
+                                    <p:set>
+                                      <p:cBhvr>
+                                        <p:cTn id="20" dur="1" fill="hold">
+                                          <p:stCondLst>
+                                            <p:cond delay="0"/>
+                                          </p:stCondLst>
+                                        </p:cTn>
+                                        <p:tgtEl>
+                                          <p:spTgt spid="9"/>
+                                        </p:tgtEl>
+                                        <p:attrNameLst>
+                                          <p:attrName>style.visibility</p:attrName>
+                                        </p:attrNameLst>
+                                      </p:cBhvr>
+                                      <p:to>
+                                        <p:strVal val="visible"/>
+                                      </p:to>
+                                    </p:set>
+                                    <p:animEffect transition="in" filter="fade">
+                                      <p:cBhvr>
+                                        <p:cTn id="21" dur="500"/>
+                                        <p:tgtEl>
+                                          <p:spTgt spid="9"/>
+                                        </p:tgtEl>
+                                      </p:cBhvr>
+                                    </p:animEffect>
+                                  </p:childTnLst>
+                                </p:cTn>
+                              </p:par>
+                            </p:childTnLst>
+                          </p:cTn>
+                        </p:par>
+                      </p:childTnLst>
+                    </p:cTn>
+                  </p:par>
+                  <p:par>
+                    <p:cTn id="22" fill="hold">
+                      <p:stCondLst>
+                        <p:cond delay="indefinite"/>
+                      </p:stCondLst>
+                      <p:childTnLst>
+                        <p:par>
+                          <p:cTn id="23" fill="hold">
+                            <p:stCondLst>
+                              <p:cond delay="0"/>
+                            </p:stCondLst>
+                            <p:childTnLst>
+                              <p:par>
+                                <p:cTn id="24" presetID="1" presetClass="entr" presetSubtype="0" fill="hold" grpId="0" nodeType="clickEffect">
+                                  <p:stCondLst>
+                                    <p:cond delay="0"/>
+                                  </p:stCondLst>
+                                  <p:childTnLst>
+                                    <p:set>
+                                      <p:cBhvr>
+                                        <p:cTn id="25" dur="1" fill="hold">
+                                          <p:stCondLst>
+                                            <p:cond delay="0"/>
+                                          </p:stCondLst>
+                                        </p:cTn>
+                                        <p:tgtEl>
+                                          <p:spTgt spid="16"/>
+                                        </p:tgtEl>
+                                        <p:attrNameLst>
+                                          <p:attrName>style.visibility</p:attrName>
+                                        </p:attrNameLst>
+                                      </p:cBhvr>
+                                      <p:to>
+                                        <p:strVal val="visible"/>
+                                      </p:to>
+                                    </p:set>
+                                  </p:childTnLst>
+                                </p:cTn>
+                              </p:par>
+                            </p:childTnLst>
+                          </p:cTn>
+                        </p:par>
+                      </p:childTnLst>
+                    </p:cTn>
+                  </p:par>
+                  <p:par>
+                    <p:cTn id="26" fill="hold">
+                      <p:stCondLst>
+                        <p:cond delay="indefinite"/>
+                      </p:stCondLst>
+                      <p:childTnLst>
+                        <p:par>
+                          <p:cTn id="27" fill="hold">
+                            <p:stCondLst>
+                              <p:cond delay="0"/>
+                            </p:stCondLst>
+                            <p:childTnLst>
+                              <p:par>
+                                <p:cTn id="28" presetID="10" presetClass="entr" presetSubtype="0" fill="hold" nodeType="clickEffect">
+                                  <p:stCondLst>
+                                    <p:cond delay="0"/>
+                                  </p:stCondLst>
+                                  <p:childTnLst>
+                                    <p:set>
+                                      <p:cBhvr>
+                                        <p:cTn id="29" dur="1" fill="hold">
+                                          <p:stCondLst>
+                                            <p:cond delay="0"/>
+                                          </p:stCondLst>
+                                        </p:cTn>
+                                        <p:tgtEl>
+                                          <p:spTgt spid="11"/>
+                                        </p:tgtEl>
+                                        <p:attrNameLst>
+                                          <p:attrName>style.visibility</p:attrName>
+                                        </p:attrNameLst>
+                                      </p:cBhvr>
+                                      <p:to>
+                                        <p:strVal val="visible"/>
+                                      </p:to>
+                                    </p:set>
+                                    <p:animEffect transition="in" filter="fade">
+                                      <p:cBhvr>
+                                        <p:cTn id="30" dur="500"/>
+                                        <p:tgtEl>
+                                          <p:spTgt spid="11"/>
+                                        </p:tgtEl>
+                                      </p:cBhvr>
+                                    </p:animEffect>
+                                  </p:childTnLst>
+                                </p:cTn>
+                              </p:par>
+                            </p:childTnLst>
+                          </p:cTn>
+                        </p:par>
+                      </p:childTnLst>
+                    </p:cTn>
+                  </p:par>
+                  <p:par>
+                    <p:cTn id="31" fill="hold">
+                      <p:stCondLst>
+                        <p:cond delay="indefinite"/>
+                      </p:stCondLst>
+                      <p:childTnLst>
+                        <p:par>
+                          <p:cTn id="32" fill="hold">
+                            <p:stCondLst>
+                              <p:cond delay="0"/>
+                            </p:stCondLst>
+                            <p:childTnLst>
+                              <p:par>
+                                <p:cTn id="33" presetID="1" presetClass="entr" presetSubtype="0" fill="hold" grpId="0" nodeType="clickEffect">
+                                  <p:stCondLst>
+                                    <p:cond delay="0"/>
+                                  </p:stCondLst>
+                                  <p:childTnLst>
+                                    <p:set>
+                                      <p:cBhvr>
+                                        <p:cTn id="34" dur="1" fill="hold">
+                                          <p:stCondLst>
+                                            <p:cond delay="0"/>
+                                          </p:stCondLst>
+                                        </p:cTn>
+                                        <p:tgtEl>
+                                          <p:spTgt spid="17"/>
+                                        </p:tgtEl>
+                                        <p:attrNameLst>
+                                          <p:attrName>style.visibility</p:attrName>
+                                        </p:attrNameLst>
+                                      </p:cBhvr>
+                                      <p:to>
+                                        <p:strVal val="visible"/>
+                                      </p:to>
+                                    </p:set>
+                                  </p:childTnLst>
+                                </p:cTn>
+                              </p:par>
+                            </p:childTnLst>
+                          </p:cTn>
+                        </p:par>
+                      </p:childTnLst>
+                    </p:cTn>
+                  </p:par>
+                  <p:par>
+                    <p:cTn id="35" fill="hold">
+                      <p:stCondLst>
+                        <p:cond delay="indefinite"/>
+                      </p:stCondLst>
+                      <p:childTnLst>
+                        <p:par>
+                          <p:cTn id="36" fill="hold">
+                            <p:stCondLst>
+                              <p:cond delay="0"/>
+                            </p:stCondLst>
+                            <p:childTnLst>
+                              <p:par>
+                                <p:cTn id="37" presetID="10" presetClass="entr" presetSubtype="0" fill="hold" nodeType="clickEffect">
+                                  <p:stCondLst>
+                                    <p:cond delay="0"/>
+                                  </p:stCondLst>
+                                  <p:childTnLst>
+                                    <p:set>
+                                      <p:cBhvr>
+                                        <p:cTn id="38" dur="1" fill="hold">
+                                          <p:stCondLst>
+                                            <p:cond delay="0"/>
+                                          </p:stCondLst>
+                                        </p:cTn>
+                                        <p:tgtEl>
+                                          <p:spTgt spid="13"/>
+                                        </p:tgtEl>
+                                        <p:attrNameLst>
+                                          <p:attrName>style.visibility</p:attrName>
+                                        </p:attrNameLst>
+                                      </p:cBhvr>
+                                      <p:to>
+                                        <p:strVal val="visible"/>
+                                      </p:to>
+                                    </p:set>
+                                    <p:animEffect transition="in" filter="fade">
+                                      <p:cBhvr>
+                                        <p:cTn id="39" dur="500"/>
+                                        <p:tgtEl>
+                                          <p:spTgt spid="13"/>
+                                        </p:tgtEl>
+                                      </p:cBhvr>
+                                    </p:animEffect>
+                                  </p:childTnLst>
+                                </p:cTn>
+                              </p:par>
+                            </p:childTnLst>
+                          </p:cTn>
+                        </p:par>
+                      </p:childTnLst>
+                    </p:cTn>
+                  </p:par>
+                </p:childTnLst>
+              </p:cTn>
+              <p:prevCondLst>
+                <p:cond evt="onPrev" delay="0">
+                  <p:tgtEl>
+                    <p:sldTgt/>
+                  </p:tgtEl>
+                </p:cond>
+              </p:prevCondLst>
+              <p:nextCondLst>
+                <p:cond evt="onNext" delay="0">
+                  <p:tgtEl>
+                    <p:sldTgt/>
+                  </p:tgtEl>
+                </p:cond>
+              </p:nextCondLst>
+            </p:seq>
+          </p:childTnLst>
+        </p:cTn>
+      </p:par>
+    </p:tnLst>
+    <p:bldLst>
+      <p:bldP spid="14" grpId="0" animBg="1"/>
+      <p:bldP spid="15" grpId="0" animBg="1"/>
+      <p:bldP spid="16" grpId="0" animBg="1"/>
+      <p:bldP spid="17" grpId="0" animBg="1"/>
+    </p:bldLst>
+  </p:timing>
+</p:sld>
+</file>
+
+<file path=ppt/slides/slide9.xml><?xml version="1.0" encoding="utf-8"?>
+<p:sld xmlns:a="http://schemas.openxmlformats.org/drawingml/2006/main" xmlns:r="http://schemas.openxmlformats.org/officeDocument/2006/relationships" xmlns:p="http://schemas.openxmlformats.org/presentationml/2006/main">
+  <p:cSld>
+    <p:spTree>
+      <p:nvGrpSpPr>
+        <p:cNvPr id="1" name=""/>
+        <p:cNvGrpSpPr/>
+        <p:nvPr/>
+      </p:nvGrpSpPr>
+      <p:grpSpPr>
+        <a:xfrm>
+          <a:off x="0" y="0"/>
+          <a:ext cx="0" cy="0"/>
+          <a:chOff x="0" y="0"/>
+          <a:chExt cx="0" cy="0"/>
+        </a:xfrm>
+      </p:grpSpPr>
+      <p:sp>
+        <p:nvSpPr>
+          <p:cNvPr id="7" name="TextBox 6">
+            <a:extLst>
+              <a:ext uri="{FF2B5EF4-FFF2-40B4-BE49-F238E27FC236}">
+                <a16:creationId xmlns:a16="http://schemas.microsoft.com/office/drawing/2014/main" id="{648EFED8-F9DC-F5D0-BAA4-2A1A0EB41D89}"/>
+              </a:ext>
+            </a:extLst>
+          </p:cNvPr>
+          <p:cNvSpPr txBox="1"/>
+          <p:nvPr/>
+        </p:nvSpPr>
+        <p:spPr>
+          <a:xfrm>
+            <a:off x="430925" y="535292"/>
+            <a:ext cx="6096000" cy="646331"/>
+          </a:xfrm>
+          <a:prstGeom prst="rect">
+            <a:avLst/>
+          </a:prstGeom>
+          <a:noFill/>
+        </p:spPr>
+        <p:txBody>
+          <a:bodyPr wrap="square">
+            <a:spAutoFit/>
+          </a:bodyPr>
+          <a:lstStyle/>
+          <a:p>
+            <a:r>
+              <a:rPr lang="en-US" sz="3600" dirty="0">
+                <a:solidFill>
+                  <a:srgbClr val="FE5722"/>
+                </a:solidFill>
+              </a:rPr>
+              <a:t>Live demo </a:t>
+            </a:r>
+            <a:endParaRPr lang="en-US" sz="3600" dirty="0"/>
+          </a:p>
+        </p:txBody>
+      </p:sp>
+    </p:spTree>
+    <p:extLst>
+      <p:ext uri="{BB962C8B-B14F-4D97-AF65-F5344CB8AC3E}">
+        <p14:creationId xmlns:p14="http://schemas.microsoft.com/office/powerpoint/2010/main" val="1873534557"/>
       </p:ext>
     </p:extLst>
   </p:cSld>

</xml_diff>